<commit_message>
I added the 101 on for and functions. I removed the introduction of modules this week. It is too many new notions. I prefer to make the 101 for modules on week 3.
</commit_message>
<xml_diff>
--- a/semaine2/CO12AL-W2-VIDEO06-SLIDE01.pptx
+++ b/semaine2/CO12AL-W2-VIDEO06-SLIDE01.pptx
@@ -966,12 +966,33 @@
               <a:rPr lang="fr-FR" baseline="0" dirty="0" smtClean="0"/>
               <a:t> la notion de bloc d’instructions. </a:t>
             </a:r>
+            <a:endParaRPr lang="fr-FR" baseline="0" dirty="0" smtClean="0"/>
           </a:p>
           <a:p>
             <a:r>
               <a:rPr lang="fr-FR" baseline="0" dirty="0" smtClean="0"/>
-              <a:t>Toutes les instructions du même bloc sont exécutés séquentiellement. </a:t>
-            </a:r>
+              <a:t>Un bloc d’instruction est un ensemble d’instruction toutes décalée de 4 caractères sur la droite (on dit indenté) et toujours précédé d’un :</a:t>
+            </a:r>
+            <a:endParaRPr lang="fr-FR" baseline="0" dirty="0" smtClean="0"/>
+          </a:p>
+          <a:p>
+            <a:r>
+              <a:rPr lang="fr-FR" baseline="0" dirty="0" smtClean="0"/>
+              <a:t>Les </a:t>
+            </a:r>
+            <a:r>
+              <a:rPr lang="fr-FR" baseline="0" dirty="0" smtClean="0"/>
+              <a:t>instructions du même bloc sont exécutés séquentiellement. </a:t>
+            </a:r>
+            <a:r>
+              <a:rPr lang="fr-FR" baseline="0" dirty="0" smtClean="0"/>
+              <a:t> On retrouvera cette notion de bloc d’instruction pour les boucles for et </a:t>
+            </a:r>
+            <a:r>
+              <a:rPr lang="fr-FR" baseline="0" smtClean="0"/>
+              <a:t>les fonctions. </a:t>
+            </a:r>
+            <a:endParaRPr lang="fr-FR" baseline="0" dirty="0" smtClean="0"/>
           </a:p>
           <a:p>
             <a:endParaRPr lang="fr-FR" baseline="0" dirty="0" smtClean="0"/>
@@ -1011,7 +1032,6 @@
               <a:rPr lang="fr-FR" baseline="0" dirty="0" smtClean="0"/>
               <a:t>Regardons la force de la syntaxe Python</a:t>
             </a:r>
-            <a:endParaRPr lang="fr-FR" baseline="0" dirty="0" smtClean="0"/>
           </a:p>
         </p:txBody>
       </p:sp>
@@ -5846,6 +5866,51 @@
                                           </p:stCondLst>
                                         </p:cTn>
                                         <p:tgtEl>
+                                          <p:spTgt spid="15"/>
+                                        </p:tgtEl>
+                                        <p:attrNameLst>
+                                          <p:attrName>style.visibility</p:attrName>
+                                        </p:attrNameLst>
+                                      </p:cBhvr>
+                                      <p:to>
+                                        <p:strVal val="visible"/>
+                                      </p:to>
+                                    </p:set>
+                                  </p:childTnLst>
+                                </p:cTn>
+                              </p:par>
+                            </p:childTnLst>
+                          </p:cTn>
+                        </p:par>
+                      </p:childTnLst>
+                    </p:cTn>
+                  </p:par>
+                  <p:par>
+                    <p:cTn id="40" fill="hold">
+                      <p:stCondLst>
+                        <p:cond delay="indefinite"/>
+                      </p:stCondLst>
+                      <p:childTnLst>
+                        <p:par>
+                          <p:cTn id="41" fill="hold">
+                            <p:stCondLst>
+                              <p:cond delay="0"/>
+                            </p:stCondLst>
+                            <p:childTnLst>
+                              <p:par>
+                                <p:cTn id="42" presetID="1" presetClass="entr" presetSubtype="0" fill="hold" nodeType="clickEffect">
+                                  <p:stCondLst>
+                                    <p:cond delay="0"/>
+                                  </p:stCondLst>
+                                  <p:childTnLst>
+                                    <p:set>
+                                      <p:cBhvr>
+                                        <p:cTn id="43" dur="1" fill="hold">
+                                          <p:stCondLst>
+                                            <p:cond delay="0"/>
+                                          </p:stCondLst>
+                                        </p:cTn>
+                                        <p:tgtEl>
                                           <p:spTgt spid="11"/>
                                         </p:tgtEl>
                                         <p:attrNameLst>
@@ -5860,14 +5925,14 @@
                                 </p:cTn>
                               </p:par>
                               <p:par>
-                                <p:cTn id="40" presetID="1" presetClass="entr" presetSubtype="0" fill="hold" nodeType="withEffect">
+                                <p:cTn id="44" presetID="1" presetClass="entr" presetSubtype="0" fill="hold" nodeType="withEffect">
                                   <p:stCondLst>
                                     <p:cond delay="0"/>
                                   </p:stCondLst>
                                   <p:childTnLst>
                                     <p:set>
                                       <p:cBhvr>
-                                        <p:cTn id="41" dur="1" fill="hold">
+                                        <p:cTn id="45" dur="1" fill="hold">
                                           <p:stCondLst>
                                             <p:cond delay="0"/>
                                           </p:stCondLst>
@@ -5893,26 +5958,26 @@
                     </p:cTn>
                   </p:par>
                   <p:par>
-                    <p:cTn id="42" fill="hold">
+                    <p:cTn id="46" fill="hold">
                       <p:stCondLst>
                         <p:cond delay="indefinite"/>
                       </p:stCondLst>
                       <p:childTnLst>
                         <p:par>
-                          <p:cTn id="43" fill="hold">
+                          <p:cTn id="47" fill="hold">
                             <p:stCondLst>
                               <p:cond delay="0"/>
                             </p:stCondLst>
                             <p:childTnLst>
                               <p:par>
-                                <p:cTn id="44" presetID="1" presetClass="entr" presetSubtype="0" fill="hold" nodeType="clickEffect">
+                                <p:cTn id="48" presetID="1" presetClass="entr" presetSubtype="0" fill="hold" nodeType="clickEffect">
                                   <p:stCondLst>
                                     <p:cond delay="0"/>
                                   </p:stCondLst>
                                   <p:childTnLst>
                                     <p:set>
                                       <p:cBhvr>
-                                        <p:cTn id="45" dur="1" fill="hold">
+                                        <p:cTn id="49" dur="1" fill="hold">
                                           <p:stCondLst>
                                             <p:cond delay="0"/>
                                           </p:stCondLst>
@@ -5932,14 +5997,41 @@
                                 </p:cTn>
                               </p:par>
                               <p:par>
-                                <p:cTn id="46" presetID="1" presetClass="exit" presetSubtype="0" fill="hold" nodeType="withEffect">
+                                <p:cTn id="50" presetID="1" presetClass="exit" presetSubtype="0" fill="hold" nodeType="withEffect">
                                   <p:stCondLst>
                                     <p:cond delay="0"/>
                                   </p:stCondLst>
                                   <p:childTnLst>
                                     <p:set>
                                       <p:cBhvr>
-                                        <p:cTn id="47" dur="1" fill="hold">
+                                        <p:cTn id="51" dur="1" fill="hold">
+                                          <p:stCondLst>
+                                            <p:cond delay="0"/>
+                                          </p:stCondLst>
+                                        </p:cTn>
+                                        <p:tgtEl>
+                                          <p:spTgt spid="15"/>
+                                        </p:tgtEl>
+                                        <p:attrNameLst>
+                                          <p:attrName>style.visibility</p:attrName>
+                                        </p:attrNameLst>
+                                      </p:cBhvr>
+                                      <p:to>
+                                        <p:strVal val="hidden"/>
+                                      </p:to>
+                                    </p:set>
+                                  </p:childTnLst>
+                                </p:cTn>
+                              </p:par>
+                              <p:par>
+                                <p:cTn id="52" presetID="1" presetClass="exit" presetSubtype="0" fill="hold" nodeType="withEffect">
+                                  <p:stCondLst>
+                                    <p:cond delay="0"/>
+                                  </p:stCondLst>
+                                  <p:childTnLst>
+                                    <p:set>
+                                      <p:cBhvr>
+                                        <p:cTn id="53" dur="1" fill="hold">
                                           <p:stCondLst>
                                             <p:cond delay="0"/>
                                           </p:stCondLst>
@@ -5959,14 +6051,14 @@
                                 </p:cTn>
                               </p:par>
                               <p:par>
-                                <p:cTn id="48" presetID="1" presetClass="exit" presetSubtype="0" fill="hold" nodeType="withEffect">
+                                <p:cTn id="54" presetID="1" presetClass="exit" presetSubtype="0" fill="hold" nodeType="withEffect">
                                   <p:stCondLst>
                                     <p:cond delay="0"/>
                                   </p:stCondLst>
                                   <p:childTnLst>
                                     <p:set>
                                       <p:cBhvr>
-                                        <p:cTn id="49" dur="1" fill="hold">
+                                        <p:cTn id="55" dur="1" fill="hold">
                                           <p:stCondLst>
                                             <p:cond delay="0"/>
                                           </p:stCondLst>
@@ -5992,91 +6084,19 @@
                     </p:cTn>
                   </p:par>
                   <p:par>
-                    <p:cTn id="50" fill="hold">
+                    <p:cTn id="56" fill="hold">
                       <p:stCondLst>
                         <p:cond delay="indefinite"/>
                       </p:stCondLst>
                       <p:childTnLst>
                         <p:par>
-                          <p:cTn id="51" fill="hold">
+                          <p:cTn id="57" fill="hold">
                             <p:stCondLst>
                               <p:cond delay="0"/>
                             </p:stCondLst>
                             <p:childTnLst>
                               <p:par>
-                                <p:cTn id="52" presetID="1" presetClass="entr" presetSubtype="0" fill="hold" nodeType="clickEffect">
-                                  <p:stCondLst>
-                                    <p:cond delay="0"/>
-                                  </p:stCondLst>
-                                  <p:childTnLst>
-                                    <p:set>
-                                      <p:cBhvr>
-                                        <p:cTn id="53" dur="1" fill="hold">
-                                          <p:stCondLst>
-                                            <p:cond delay="0"/>
-                                          </p:stCondLst>
-                                        </p:cTn>
-                                        <p:tgtEl>
-                                          <p:spTgt spid="13"/>
-                                        </p:tgtEl>
-                                        <p:attrNameLst>
-                                          <p:attrName>style.visibility</p:attrName>
-                                        </p:attrNameLst>
-                                      </p:cBhvr>
-                                      <p:to>
-                                        <p:strVal val="visible"/>
-                                      </p:to>
-                                    </p:set>
-                                  </p:childTnLst>
-                                </p:cTn>
-                              </p:par>
-                            </p:childTnLst>
-                          </p:cTn>
-                        </p:par>
-                      </p:childTnLst>
-                    </p:cTn>
-                  </p:par>
-                  <p:par>
-                    <p:cTn id="54" fill="hold">
-                      <p:stCondLst>
-                        <p:cond delay="indefinite"/>
-                      </p:stCondLst>
-                      <p:childTnLst>
-                        <p:par>
-                          <p:cTn id="55" fill="hold">
-                            <p:stCondLst>
-                              <p:cond delay="0"/>
-                            </p:stCondLst>
-                            <p:childTnLst>
-                              <p:par>
-                                <p:cTn id="56" presetID="1" presetClass="entr" presetSubtype="0" fill="hold" nodeType="clickEffect">
-                                  <p:stCondLst>
-                                    <p:cond delay="0"/>
-                                  </p:stCondLst>
-                                  <p:childTnLst>
-                                    <p:set>
-                                      <p:cBhvr>
-                                        <p:cTn id="57" dur="1" fill="hold">
-                                          <p:stCondLst>
-                                            <p:cond delay="0"/>
-                                          </p:stCondLst>
-                                        </p:cTn>
-                                        <p:tgtEl>
-                                          <p:spTgt spid="15"/>
-                                        </p:tgtEl>
-                                        <p:attrNameLst>
-                                          <p:attrName>style.visibility</p:attrName>
-                                        </p:attrNameLst>
-                                      </p:cBhvr>
-                                      <p:to>
-                                        <p:strVal val="visible"/>
-                                      </p:to>
-                                    </p:set>
-                                  </p:childTnLst>
-                                </p:cTn>
-                              </p:par>
-                              <p:par>
-                                <p:cTn id="58" presetID="1" presetClass="exit" presetSubtype="0" fill="hold" nodeType="withEffect">
+                                <p:cTn id="58" presetID="1" presetClass="entr" presetSubtype="0" fill="hold" nodeType="clickEffect">
                                   <p:stCondLst>
                                     <p:cond delay="0"/>
                                   </p:stCondLst>
@@ -6089,14 +6109,14 @@
                                           </p:stCondLst>
                                         </p:cTn>
                                         <p:tgtEl>
-                                          <p:spTgt spid="13"/>
+                                          <p:spTgt spid="17"/>
                                         </p:tgtEl>
                                         <p:attrNameLst>
                                           <p:attrName>style.visibility</p:attrName>
                                         </p:attrNameLst>
                                       </p:cBhvr>
                                       <p:to>
-                                        <p:strVal val="hidden"/>
+                                        <p:strVal val="visible"/>
                                       </p:to>
                                     </p:set>
                                   </p:childTnLst>
@@ -6134,7 +6154,7 @@
                                           </p:stCondLst>
                                         </p:cTn>
                                         <p:tgtEl>
-                                          <p:spTgt spid="17"/>
+                                          <p:spTgt spid="13"/>
                                         </p:tgtEl>
                                         <p:attrNameLst>
                                           <p:attrName>style.visibility</p:attrName>
@@ -6206,7 +6226,7 @@
                                           </p:stCondLst>
                                         </p:cTn>
                                         <p:tgtEl>
-                                          <p:spTgt spid="15"/>
+                                          <p:spTgt spid="17"/>
                                         </p:tgtEl>
                                         <p:attrNameLst>
                                           <p:attrName>style.visibility</p:attrName>
@@ -6233,7 +6253,7 @@
                                           </p:stCondLst>
                                         </p:cTn>
                                         <p:tgtEl>
-                                          <p:spTgt spid="17"/>
+                                          <p:spTgt spid="13"/>
                                         </p:tgtEl>
                                         <p:attrNameLst>
                                           <p:attrName>style.visibility</p:attrName>

</xml_diff>

<commit_message>
removed the trashed slides
</commit_message>
<xml_diff>
--- a/semaine2/CO12AL-W2-VIDEO06-SLIDE01.pptx
+++ b/semaine2/CO12AL-W2-VIDEO06-SLIDE01.pptx
@@ -5,18 +5,13 @@
     <p:sldMasterId id="2147483649" r:id="rId1"/>
   </p:sldMasterIdLst>
   <p:notesMasterIdLst>
-    <p:notesMasterId r:id="rId8"/>
+    <p:notesMasterId r:id="rId3"/>
   </p:notesMasterIdLst>
   <p:handoutMasterIdLst>
-    <p:handoutMasterId r:id="rId9"/>
+    <p:handoutMasterId r:id="rId4"/>
   </p:handoutMasterIdLst>
   <p:sldIdLst>
     <p:sldId id="256" r:id="rId2"/>
-    <p:sldId id="262" r:id="rId3"/>
-    <p:sldId id="258" r:id="rId4"/>
-    <p:sldId id="257" r:id="rId5"/>
-    <p:sldId id="260" r:id="rId6"/>
-    <p:sldId id="261" r:id="rId7"/>
   </p:sldIdLst>
   <p:sldSz cx="9144000" cy="6858000" type="screen4x3"/>
   <p:notesSz cx="7099300" cy="10234613"/>
@@ -151,17 +146,12 @@
         <p14:section name="Section par défaut" id="{28C650F0-13B2-49C9-9ED4-D40CD07835D6}">
           <p14:sldIdLst>
             <p14:sldId id="256"/>
-            <p14:sldId id="262"/>
-            <p14:sldId id="258"/>
-            <p14:sldId id="257"/>
-            <p14:sldId id="260"/>
-            <p14:sldId id="261"/>
           </p14:sldIdLst>
         </p14:section>
       </p14:sectionLst>
     </p:ext>
     <p:ext uri="{EFAFB233-063F-42B5-8137-9DF3F51BA10A}">
-      <p15:sldGuideLst xmlns:p15="http://schemas.microsoft.com/office/powerpoint/2012/main" xmlns="">
+      <p15:sldGuideLst xmlns:p15="http://schemas.microsoft.com/office/powerpoint/2012/main">
         <p15:guide id="1" orient="horz" pos="2160">
           <p15:clr>
             <a:srgbClr val="A4A3A4"/>
@@ -412,7 +402,7 @@
               <a:pPr>
                 <a:defRPr/>
               </a:pPr>
-              <a:t>‹#›</a:t>
+              <a:t>‹N°›</a:t>
             </a:fld>
             <a:endParaRPr lang="en-US"/>
           </a:p>
@@ -587,7 +577,7 @@
           </a:ln>
           <a:extLst>
             <a:ext uri="{909E8E84-426E-40dd-AFC4-6F175D3DCCD1}">
-              <a14:hiddenFill xmlns:a14="http://schemas.microsoft.com/office/drawing/2010/main">
+              <a14:hiddenFill xmlns:a14="http://schemas.microsoft.com/office/drawing/2010/main" xmlns="">
                 <a:solidFill>
                   <a:srgbClr val="FFFFFF"/>
                 </a:solidFill>
@@ -772,7 +762,7 @@
               <a:pPr>
                 <a:defRPr/>
               </a:pPr>
-              <a:t>‹#›</a:t>
+              <a:t>‹N°›</a:t>
             </a:fld>
             <a:endParaRPr lang="en-US"/>
           </a:p>
@@ -976,31 +966,7 @@
           <a:p>
             <a:r>
               <a:rPr lang="fr-FR" baseline="0" dirty="0" smtClean="0"/>
-              <a:t>Les instructions du même bloc sont </a:t>
-            </a:r>
-            <a:r>
-              <a:rPr lang="fr-FR" baseline="0" dirty="0" smtClean="0"/>
-              <a:t>exécutées </a:t>
-            </a:r>
-            <a:r>
-              <a:rPr lang="fr-FR" baseline="0" dirty="0" smtClean="0"/>
-              <a:t>séquentiellement.  On retrouvera cette notion </a:t>
-            </a:r>
-            <a:r>
-              <a:rPr lang="fr-FR" baseline="0" dirty="0" smtClean="0"/>
-              <a:t>d</a:t>
-            </a:r>
-            <a:r>
-              <a:rPr lang="fr-FR" baseline="0" dirty="0" smtClean="0"/>
-              <a:t>’indentation </a:t>
-            </a:r>
-            <a:r>
-              <a:rPr lang="fr-FR" baseline="0" dirty="0" smtClean="0"/>
-              <a:t>pour </a:t>
-            </a:r>
-            <a:r>
-              <a:rPr lang="fr-FR" baseline="0" dirty="0" smtClean="0"/>
-              <a:t>les boucles for et les fonctions. </a:t>
+              <a:t>Les instructions du même bloc sont exécutées séquentiellement.  On retrouvera cette notion d’indentation pour les boucles for et les fonctions. </a:t>
             </a:r>
           </a:p>
           <a:p>
@@ -1077,446 +1043,6 @@
     <p:extLst>
       <p:ext uri="{BB962C8B-B14F-4D97-AF65-F5344CB8AC3E}">
         <p14:creationId xmlns:p14="http://schemas.microsoft.com/office/powerpoint/2010/main" val="657199175"/>
-      </p:ext>
-    </p:extLst>
-  </p:cSld>
-  <p:clrMapOvr>
-    <a:masterClrMapping/>
-  </p:clrMapOvr>
-</p:notes>
-</file>
-
-<file path=ppt/notesSlides/notesSlide2.xml><?xml version="1.0" encoding="utf-8"?>
-<p:notes xmlns:a="http://schemas.openxmlformats.org/drawingml/2006/main" xmlns:r="http://schemas.openxmlformats.org/officeDocument/2006/relationships" xmlns:p="http://schemas.openxmlformats.org/presentationml/2006/main">
-  <p:cSld>
-    <p:spTree>
-      <p:nvGrpSpPr>
-        <p:cNvPr id="1" name=""/>
-        <p:cNvGrpSpPr/>
-        <p:nvPr/>
-      </p:nvGrpSpPr>
-      <p:grpSpPr>
-        <a:xfrm>
-          <a:off x="0" y="0"/>
-          <a:ext cx="0" cy="0"/>
-          <a:chOff x="0" y="0"/>
-          <a:chExt cx="0" cy="0"/>
-        </a:xfrm>
-      </p:grpSpPr>
-      <p:sp>
-        <p:nvSpPr>
-          <p:cNvPr id="2" name="Espace réservé de l'image des diapositives 1"/>
-          <p:cNvSpPr>
-            <a:spLocks noGrp="1" noRot="1" noChangeAspect="1"/>
-          </p:cNvSpPr>
-          <p:nvPr>
-            <p:ph type="sldImg"/>
-          </p:nvPr>
-        </p:nvSpPr>
-        <p:spPr/>
-      </p:sp>
-      <p:sp>
-        <p:nvSpPr>
-          <p:cNvPr id="3" name="Espace réservé des commentaires 2"/>
-          <p:cNvSpPr>
-            <a:spLocks noGrp="1"/>
-          </p:cNvSpPr>
-          <p:nvPr>
-            <p:ph type="body" idx="1"/>
-          </p:nvPr>
-        </p:nvSpPr>
-        <p:spPr/>
-        <p:txBody>
-          <a:bodyPr/>
-          <a:lstStyle/>
-          <a:p>
-            <a:r>
-              <a:rPr lang="fr-FR" dirty="0" smtClean="0"/>
-              <a:t>Comparons sans les : et avec les :</a:t>
-            </a:r>
-            <a:endParaRPr lang="fr-FR" dirty="0"/>
-          </a:p>
-        </p:txBody>
-      </p:sp>
-      <p:sp>
-        <p:nvSpPr>
-          <p:cNvPr id="4" name="Espace réservé du numéro de diapositive 3"/>
-          <p:cNvSpPr>
-            <a:spLocks noGrp="1"/>
-          </p:cNvSpPr>
-          <p:nvPr>
-            <p:ph type="sldNum" sz="quarter" idx="10"/>
-          </p:nvPr>
-        </p:nvSpPr>
-        <p:spPr/>
-        <p:txBody>
-          <a:bodyPr/>
-          <a:lstStyle/>
-          <a:p>
-            <a:pPr>
-              <a:defRPr/>
-            </a:pPr>
-            <a:fld id="{9E8EB9F5-F2F7-4A48-A943-9B409357C15C}" type="slidenum">
-              <a:rPr lang="en-US" smtClean="0"/>
-              <a:pPr>
-                <a:defRPr/>
-              </a:pPr>
-              <a:t>3</a:t>
-            </a:fld>
-            <a:endParaRPr lang="en-US"/>
-          </a:p>
-        </p:txBody>
-      </p:sp>
-    </p:spTree>
-    <p:extLst>
-      <p:ext uri="{BB962C8B-B14F-4D97-AF65-F5344CB8AC3E}">
-        <p14:creationId xmlns:p14="http://schemas.microsoft.com/office/powerpoint/2010/main" val="3354482905"/>
-      </p:ext>
-    </p:extLst>
-  </p:cSld>
-  <p:clrMapOvr>
-    <a:masterClrMapping/>
-  </p:clrMapOvr>
-</p:notes>
-</file>
-
-<file path=ppt/notesSlides/notesSlide3.xml><?xml version="1.0" encoding="utf-8"?>
-<p:notes xmlns:a="http://schemas.openxmlformats.org/drawingml/2006/main" xmlns:r="http://schemas.openxmlformats.org/officeDocument/2006/relationships" xmlns:p="http://schemas.openxmlformats.org/presentationml/2006/main">
-  <p:cSld>
-    <p:spTree>
-      <p:nvGrpSpPr>
-        <p:cNvPr id="1" name=""/>
-        <p:cNvGrpSpPr/>
-        <p:nvPr/>
-      </p:nvGrpSpPr>
-      <p:grpSpPr>
-        <a:xfrm>
-          <a:off x="0" y="0"/>
-          <a:ext cx="0" cy="0"/>
-          <a:chOff x="0" y="0"/>
-          <a:chExt cx="0" cy="0"/>
-        </a:xfrm>
-      </p:grpSpPr>
-      <p:sp>
-        <p:nvSpPr>
-          <p:cNvPr id="2" name="Espace réservé de l'image des diapositives 1"/>
-          <p:cNvSpPr>
-            <a:spLocks noGrp="1" noRot="1" noChangeAspect="1"/>
-          </p:cNvSpPr>
-          <p:nvPr>
-            <p:ph type="sldImg"/>
-          </p:nvPr>
-        </p:nvSpPr>
-        <p:spPr/>
-      </p:sp>
-      <p:sp>
-        <p:nvSpPr>
-          <p:cNvPr id="3" name="Espace réservé des commentaires 2"/>
-          <p:cNvSpPr>
-            <a:spLocks noGrp="1"/>
-          </p:cNvSpPr>
-          <p:nvPr>
-            <p:ph type="body" idx="1"/>
-          </p:nvPr>
-        </p:nvSpPr>
-        <p:spPr/>
-        <p:txBody>
-          <a:bodyPr/>
-          <a:lstStyle/>
-          <a:p>
-            <a:pPr marL="0" marR="0" indent="0" algn="l" defTabSz="914400" rtl="0" eaLnBrk="0" fontAlgn="base" latinLnBrk="0" hangingPunct="0">
-              <a:lnSpc>
-                <a:spcPct val="100000"/>
-              </a:lnSpc>
-              <a:spcBef>
-                <a:spcPct val="30000"/>
-              </a:spcBef>
-              <a:spcAft>
-                <a:spcPct val="0"/>
-              </a:spcAft>
-              <a:buClrTx/>
-              <a:buSzTx/>
-              <a:buFontTx/>
-              <a:buNone/>
-              <a:tabLst/>
-              <a:defRPr/>
-            </a:pPr>
-            <a:r>
-              <a:rPr lang="fr-FR" dirty="0" smtClean="0"/>
-              <a:t>Comparons sans les : et avec les :</a:t>
-            </a:r>
-          </a:p>
-          <a:p>
-            <a:endParaRPr lang="fr-FR" dirty="0"/>
-          </a:p>
-        </p:txBody>
-      </p:sp>
-      <p:sp>
-        <p:nvSpPr>
-          <p:cNvPr id="4" name="Espace réservé du numéro de diapositive 3"/>
-          <p:cNvSpPr>
-            <a:spLocks noGrp="1"/>
-          </p:cNvSpPr>
-          <p:nvPr>
-            <p:ph type="sldNum" sz="quarter" idx="10"/>
-          </p:nvPr>
-        </p:nvSpPr>
-        <p:spPr/>
-        <p:txBody>
-          <a:bodyPr/>
-          <a:lstStyle/>
-          <a:p>
-            <a:pPr>
-              <a:defRPr/>
-            </a:pPr>
-            <a:fld id="{9E8EB9F5-F2F7-4A48-A943-9B409357C15C}" type="slidenum">
-              <a:rPr lang="en-US" smtClean="0"/>
-              <a:pPr>
-                <a:defRPr/>
-              </a:pPr>
-              <a:t>4</a:t>
-            </a:fld>
-            <a:endParaRPr lang="en-US"/>
-          </a:p>
-        </p:txBody>
-      </p:sp>
-    </p:spTree>
-    <p:extLst>
-      <p:ext uri="{BB962C8B-B14F-4D97-AF65-F5344CB8AC3E}">
-        <p14:creationId xmlns:p14="http://schemas.microsoft.com/office/powerpoint/2010/main" val="2987586953"/>
-      </p:ext>
-    </p:extLst>
-  </p:cSld>
-  <p:clrMapOvr>
-    <a:masterClrMapping/>
-  </p:clrMapOvr>
-</p:notes>
-</file>
-
-<file path=ppt/notesSlides/notesSlide4.xml><?xml version="1.0" encoding="utf-8"?>
-<p:notes xmlns:a="http://schemas.openxmlformats.org/drawingml/2006/main" xmlns:r="http://schemas.openxmlformats.org/officeDocument/2006/relationships" xmlns:p="http://schemas.openxmlformats.org/presentationml/2006/main">
-  <p:cSld>
-    <p:spTree>
-      <p:nvGrpSpPr>
-        <p:cNvPr id="1" name=""/>
-        <p:cNvGrpSpPr/>
-        <p:nvPr/>
-      </p:nvGrpSpPr>
-      <p:grpSpPr>
-        <a:xfrm>
-          <a:off x="0" y="0"/>
-          <a:ext cx="0" cy="0"/>
-          <a:chOff x="0" y="0"/>
-          <a:chExt cx="0" cy="0"/>
-        </a:xfrm>
-      </p:grpSpPr>
-      <p:sp>
-        <p:nvSpPr>
-          <p:cNvPr id="2" name="Espace réservé de l'image des diapositives 1"/>
-          <p:cNvSpPr>
-            <a:spLocks noGrp="1" noRot="1" noChangeAspect="1"/>
-          </p:cNvSpPr>
-          <p:nvPr>
-            <p:ph type="sldImg"/>
-          </p:nvPr>
-        </p:nvSpPr>
-        <p:spPr/>
-      </p:sp>
-      <p:sp>
-        <p:nvSpPr>
-          <p:cNvPr id="3" name="Espace réservé des commentaires 2"/>
-          <p:cNvSpPr>
-            <a:spLocks noGrp="1"/>
-          </p:cNvSpPr>
-          <p:nvPr>
-            <p:ph type="body" idx="1"/>
-          </p:nvPr>
-        </p:nvSpPr>
-        <p:spPr/>
-        <p:txBody>
-          <a:bodyPr/>
-          <a:lstStyle/>
-          <a:p>
-            <a:pPr marL="0" marR="0" indent="0" algn="l" defTabSz="914400" rtl="0" eaLnBrk="0" fontAlgn="base" latinLnBrk="0" hangingPunct="0">
-              <a:lnSpc>
-                <a:spcPct val="100000"/>
-              </a:lnSpc>
-              <a:spcBef>
-                <a:spcPct val="30000"/>
-              </a:spcBef>
-              <a:spcAft>
-                <a:spcPct val="0"/>
-              </a:spcAft>
-              <a:buClrTx/>
-              <a:buSzTx/>
-              <a:buFontTx/>
-              <a:buNone/>
-              <a:tabLst/>
-              <a:defRPr/>
-            </a:pPr>
-            <a:r>
-              <a:rPr lang="fr-FR" dirty="0" smtClean="0"/>
-              <a:t>Comparons avec les accolades</a:t>
-            </a:r>
-            <a:r>
-              <a:rPr lang="fr-FR" baseline="0" dirty="0" smtClean="0"/>
-              <a:t> et différente convention de codage</a:t>
-            </a:r>
-            <a:endParaRPr lang="fr-FR" dirty="0" smtClean="0"/>
-          </a:p>
-          <a:p>
-            <a:endParaRPr lang="fr-FR" dirty="0"/>
-          </a:p>
-        </p:txBody>
-      </p:sp>
-      <p:sp>
-        <p:nvSpPr>
-          <p:cNvPr id="4" name="Espace réservé du numéro de diapositive 3"/>
-          <p:cNvSpPr>
-            <a:spLocks noGrp="1"/>
-          </p:cNvSpPr>
-          <p:nvPr>
-            <p:ph type="sldNum" sz="quarter" idx="10"/>
-          </p:nvPr>
-        </p:nvSpPr>
-        <p:spPr/>
-        <p:txBody>
-          <a:bodyPr/>
-          <a:lstStyle/>
-          <a:p>
-            <a:pPr>
-              <a:defRPr/>
-            </a:pPr>
-            <a:fld id="{9E8EB9F5-F2F7-4A48-A943-9B409357C15C}" type="slidenum">
-              <a:rPr lang="en-US" smtClean="0"/>
-              <a:pPr>
-                <a:defRPr/>
-              </a:pPr>
-              <a:t>5</a:t>
-            </a:fld>
-            <a:endParaRPr lang="en-US"/>
-          </a:p>
-        </p:txBody>
-      </p:sp>
-    </p:spTree>
-    <p:extLst>
-      <p:ext uri="{BB962C8B-B14F-4D97-AF65-F5344CB8AC3E}">
-        <p14:creationId xmlns:p14="http://schemas.microsoft.com/office/powerpoint/2010/main" val="2245915958"/>
-      </p:ext>
-    </p:extLst>
-  </p:cSld>
-  <p:clrMapOvr>
-    <a:masterClrMapping/>
-  </p:clrMapOvr>
-</p:notes>
-</file>
-
-<file path=ppt/notesSlides/notesSlide5.xml><?xml version="1.0" encoding="utf-8"?>
-<p:notes xmlns:a="http://schemas.openxmlformats.org/drawingml/2006/main" xmlns:r="http://schemas.openxmlformats.org/officeDocument/2006/relationships" xmlns:p="http://schemas.openxmlformats.org/presentationml/2006/main">
-  <p:cSld>
-    <p:spTree>
-      <p:nvGrpSpPr>
-        <p:cNvPr id="1" name=""/>
-        <p:cNvGrpSpPr/>
-        <p:nvPr/>
-      </p:nvGrpSpPr>
-      <p:grpSpPr>
-        <a:xfrm>
-          <a:off x="0" y="0"/>
-          <a:ext cx="0" cy="0"/>
-          <a:chOff x="0" y="0"/>
-          <a:chExt cx="0" cy="0"/>
-        </a:xfrm>
-      </p:grpSpPr>
-      <p:sp>
-        <p:nvSpPr>
-          <p:cNvPr id="2" name="Espace réservé de l'image des diapositives 1"/>
-          <p:cNvSpPr>
-            <a:spLocks noGrp="1" noRot="1" noChangeAspect="1"/>
-          </p:cNvSpPr>
-          <p:nvPr>
-            <p:ph type="sldImg"/>
-          </p:nvPr>
-        </p:nvSpPr>
-        <p:spPr/>
-      </p:sp>
-      <p:sp>
-        <p:nvSpPr>
-          <p:cNvPr id="3" name="Espace réservé des commentaires 2"/>
-          <p:cNvSpPr>
-            <a:spLocks noGrp="1"/>
-          </p:cNvSpPr>
-          <p:nvPr>
-            <p:ph type="body" idx="1"/>
-          </p:nvPr>
-        </p:nvSpPr>
-        <p:spPr/>
-        <p:txBody>
-          <a:bodyPr/>
-          <a:lstStyle/>
-          <a:p>
-            <a:pPr marL="0" marR="0" indent="0" algn="l" defTabSz="914400" rtl="0" eaLnBrk="0" fontAlgn="base" latinLnBrk="0" hangingPunct="0">
-              <a:lnSpc>
-                <a:spcPct val="100000"/>
-              </a:lnSpc>
-              <a:spcBef>
-                <a:spcPct val="30000"/>
-              </a:spcBef>
-              <a:spcAft>
-                <a:spcPct val="0"/>
-              </a:spcAft>
-              <a:buClrTx/>
-              <a:buSzTx/>
-              <a:buFontTx/>
-              <a:buNone/>
-              <a:tabLst/>
-              <a:defRPr/>
-            </a:pPr>
-            <a:r>
-              <a:rPr lang="fr-FR" dirty="0" smtClean="0"/>
-              <a:t>Comparons avec les accolades</a:t>
-            </a:r>
-            <a:r>
-              <a:rPr lang="fr-FR" baseline="0" dirty="0" smtClean="0"/>
-              <a:t> et différente convention de codage</a:t>
-            </a:r>
-            <a:endParaRPr lang="fr-FR" dirty="0" smtClean="0"/>
-          </a:p>
-        </p:txBody>
-      </p:sp>
-      <p:sp>
-        <p:nvSpPr>
-          <p:cNvPr id="4" name="Espace réservé du numéro de diapositive 3"/>
-          <p:cNvSpPr>
-            <a:spLocks noGrp="1"/>
-          </p:cNvSpPr>
-          <p:nvPr>
-            <p:ph type="sldNum" sz="quarter" idx="10"/>
-          </p:nvPr>
-        </p:nvSpPr>
-        <p:spPr/>
-        <p:txBody>
-          <a:bodyPr/>
-          <a:lstStyle/>
-          <a:p>
-            <a:pPr>
-              <a:defRPr/>
-            </a:pPr>
-            <a:fld id="{9E8EB9F5-F2F7-4A48-A943-9B409357C15C}" type="slidenum">
-              <a:rPr lang="en-US" smtClean="0"/>
-              <a:pPr>
-                <a:defRPr/>
-              </a:pPr>
-              <a:t>6</a:t>
-            </a:fld>
-            <a:endParaRPr lang="en-US"/>
-          </a:p>
-        </p:txBody>
-      </p:sp>
-    </p:spTree>
-    <p:extLst>
-      <p:ext uri="{BB962C8B-B14F-4D97-AF65-F5344CB8AC3E}">
-        <p14:creationId xmlns:p14="http://schemas.microsoft.com/office/powerpoint/2010/main" val="1873620068"/>
       </p:ext>
     </p:extLst>
   </p:cSld>
@@ -1694,7 +1220,7 @@
   <p:timing>
     <p:tnLst>
       <p:par>
-        <p:cTn xmlns:p14="http://schemas.microsoft.com/office/powerpoint/2010/main" id="1" dur="indefinite" restart="never" nodeType="tmRoot"/>
+        <p:cTn id="1" dur="indefinite" restart="never" nodeType="tmRoot"/>
       </p:par>
     </p:tnLst>
   </p:timing>
@@ -1854,7 +1380,7 @@
               <a:pPr>
                 <a:defRPr/>
               </a:pPr>
-              <a:t>‹#›</a:t>
+              <a:t>‹N°›</a:t>
             </a:fld>
             <a:endParaRPr lang="fr-FR"/>
           </a:p>
@@ -2036,7 +1562,7 @@
               <a:pPr>
                 <a:defRPr/>
               </a:pPr>
-              <a:t>‹#›</a:t>
+              <a:t>‹N°›</a:t>
             </a:fld>
             <a:endParaRPr lang="fr-FR"/>
           </a:p>
@@ -2275,7 +1801,7 @@
               <a:pPr>
                 <a:defRPr/>
               </a:pPr>
-              <a:t>‹#›</a:t>
+              <a:t>‹N°›</a:t>
             </a:fld>
             <a:endParaRPr lang="fr-FR"/>
           </a:p>
@@ -2447,7 +1973,7 @@
               <a:pPr>
                 <a:defRPr/>
               </a:pPr>
-              <a:t>‹#›</a:t>
+              <a:t>‹N°›</a:t>
             </a:fld>
             <a:endParaRPr lang="fr-FR"/>
           </a:p>
@@ -2466,7 +1992,7 @@
   <p:timing>
     <p:tnLst>
       <p:par>
-        <p:cTn xmlns:p14="http://schemas.microsoft.com/office/powerpoint/2010/main" id="1" dur="indefinite" restart="never" nodeType="tmRoot"/>
+        <p:cTn id="1" dur="indefinite" restart="never" nodeType="tmRoot"/>
       </p:par>
     </p:tnLst>
   </p:timing>
@@ -2648,7 +2174,7 @@
               <a:pPr>
                 <a:defRPr/>
               </a:pPr>
-              <a:t>‹#›</a:t>
+              <a:t>‹N°›</a:t>
             </a:fld>
             <a:endParaRPr lang="fr-FR"/>
           </a:p>
@@ -2667,7 +2193,7 @@
   <p:timing>
     <p:tnLst>
       <p:par>
-        <p:cTn xmlns:p14="http://schemas.microsoft.com/office/powerpoint/2010/main" id="1" dur="indefinite" restart="never" nodeType="tmRoot"/>
+        <p:cTn id="1" dur="indefinite" restart="never" nodeType="tmRoot"/>
       </p:par>
     </p:tnLst>
   </p:timing>
@@ -2945,7 +2471,7 @@
               <a:pPr>
                 <a:defRPr/>
               </a:pPr>
-              <a:t>‹#›</a:t>
+              <a:t>‹N°›</a:t>
             </a:fld>
             <a:endParaRPr lang="fr-FR"/>
           </a:p>
@@ -2964,7 +2490,7 @@
   <p:timing>
     <p:tnLst>
       <p:par>
-        <p:cTn xmlns:p14="http://schemas.microsoft.com/office/powerpoint/2010/main" id="1" dur="indefinite" restart="never" nodeType="tmRoot"/>
+        <p:cTn id="1" dur="indefinite" restart="never" nodeType="tmRoot"/>
       </p:par>
     </p:tnLst>
   </p:timing>
@@ -3376,7 +2902,7 @@
               <a:pPr>
                 <a:defRPr/>
               </a:pPr>
-              <a:t>‹#›</a:t>
+              <a:t>‹N°›</a:t>
             </a:fld>
             <a:endParaRPr lang="fr-FR"/>
           </a:p>
@@ -3395,7 +2921,7 @@
   <p:timing>
     <p:tnLst>
       <p:par>
-        <p:cTn xmlns:p14="http://schemas.microsoft.com/office/powerpoint/2010/main" id="1" dur="indefinite" restart="never" nodeType="tmRoot"/>
+        <p:cTn id="1" dur="indefinite" restart="never" nodeType="tmRoot"/>
       </p:par>
     </p:tnLst>
   </p:timing>
@@ -3503,7 +3029,7 @@
               <a:pPr>
                 <a:defRPr/>
               </a:pPr>
-              <a:t>‹#›</a:t>
+              <a:t>‹N°›</a:t>
             </a:fld>
             <a:endParaRPr lang="fr-FR"/>
           </a:p>
@@ -3522,7 +3048,7 @@
   <p:timing>
     <p:tnLst>
       <p:par>
-        <p:cTn xmlns:p14="http://schemas.microsoft.com/office/powerpoint/2010/main" id="1" dur="indefinite" restart="never" nodeType="tmRoot"/>
+        <p:cTn id="1" dur="indefinite" restart="never" nodeType="tmRoot"/>
       </p:par>
     </p:tnLst>
   </p:timing>
@@ -3607,7 +3133,7 @@
               <a:pPr>
                 <a:defRPr/>
               </a:pPr>
-              <a:t>‹#›</a:t>
+              <a:t>‹N°›</a:t>
             </a:fld>
             <a:endParaRPr lang="fr-FR"/>
           </a:p>
@@ -3626,7 +3152,7 @@
   <p:timing>
     <p:tnLst>
       <p:par>
-        <p:cTn xmlns:p14="http://schemas.microsoft.com/office/powerpoint/2010/main" id="1" dur="indefinite" restart="never" nodeType="tmRoot"/>
+        <p:cTn id="1" dur="indefinite" restart="never" nodeType="tmRoot"/>
       </p:par>
     </p:tnLst>
   </p:timing>
@@ -3893,7 +3419,7 @@
               <a:pPr>
                 <a:defRPr/>
               </a:pPr>
-              <a:t>‹#›</a:t>
+              <a:t>‹N°›</a:t>
             </a:fld>
             <a:endParaRPr lang="fr-FR"/>
           </a:p>
@@ -4149,7 +3675,7 @@
               <a:pPr>
                 <a:defRPr/>
               </a:pPr>
-              <a:t>‹#›</a:t>
+              <a:t>‹N°›</a:t>
             </a:fld>
             <a:endParaRPr lang="fr-FR"/>
           </a:p>
@@ -4217,14 +3743,14 @@
           </a:ln>
           <a:extLst>
             <a:ext uri="{909E8E84-426E-40dd-AFC4-6F175D3DCCD1}">
-              <a14:hiddenFill xmlns:a14="http://schemas.microsoft.com/office/drawing/2010/main">
+              <a14:hiddenFill xmlns:a14="http://schemas.microsoft.com/office/drawing/2010/main" xmlns="">
                 <a:solidFill>
                   <a:srgbClr val="FFFFFF"/>
                 </a:solidFill>
               </a14:hiddenFill>
             </a:ext>
             <a:ext uri="{91240B29-F687-4f45-9708-019B960494DF}">
-              <a14:hiddenLine xmlns:a14="http://schemas.microsoft.com/office/drawing/2010/main" w="9525">
+              <a14:hiddenLine xmlns:a14="http://schemas.microsoft.com/office/drawing/2010/main" xmlns="" w="9525">
                 <a:solidFill>
                   <a:srgbClr val="000000"/>
                 </a:solidFill>
@@ -4275,14 +3801,14 @@
           </a:ln>
           <a:extLst>
             <a:ext uri="{909E8E84-426E-40dd-AFC4-6F175D3DCCD1}">
-              <a14:hiddenFill xmlns:a14="http://schemas.microsoft.com/office/drawing/2010/main">
+              <a14:hiddenFill xmlns:a14="http://schemas.microsoft.com/office/drawing/2010/main" xmlns="">
                 <a:solidFill>
                   <a:srgbClr val="FFFFFF"/>
                 </a:solidFill>
               </a14:hiddenFill>
             </a:ext>
             <a:ext uri="{91240B29-F687-4f45-9708-019B960494DF}">
-              <a14:hiddenLine xmlns:a14="http://schemas.microsoft.com/office/drawing/2010/main" w="9525">
+              <a14:hiddenLine xmlns:a14="http://schemas.microsoft.com/office/drawing/2010/main" xmlns="" w="9525">
                 <a:solidFill>
                   <a:srgbClr val="000000"/>
                 </a:solidFill>
@@ -4452,7 +3978,7 @@
               <a:pPr>
                 <a:defRPr/>
               </a:pPr>
-              <a:t>‹#›</a:t>
+              <a:t>‹N°›</a:t>
             </a:fld>
             <a:endParaRPr lang="fr-FR" dirty="0"/>
           </a:p>
@@ -4478,7 +4004,7 @@
   <p:timing>
     <p:tnLst>
       <p:par>
-        <p:cTn xmlns:p14="http://schemas.microsoft.com/office/powerpoint/2010/main" id="1" dur="indefinite" restart="never" nodeType="tmRoot"/>
+        <p:cTn id="1" dur="indefinite" restart="never" nodeType="tmRoot"/>
       </p:par>
     </p:tnLst>
   </p:timing>
@@ -5424,7 +4950,7 @@
   <p:timing>
     <p:tnLst>
       <p:par>
-        <p:cTn xmlns:p14="http://schemas.microsoft.com/office/powerpoint/2010/main" id="1" dur="indefinite" restart="never" nodeType="tmRoot">
+        <p:cTn id="1" dur="indefinite" restart="never" nodeType="tmRoot">
           <p:childTnLst>
             <p:seq concurrent="1" nextAc="seek">
               <p:cTn id="2" dur="indefinite" nodeType="mainSeq">
@@ -6306,962 +5832,6 @@
       <p:bldP spid="2" grpId="0" animBg="1"/>
       <p:bldP spid="2" grpId="1" animBg="1"/>
     </p:bldLst>
-  </p:timing>
-</p:sld>
-</file>
-
-<file path=ppt/slides/slide2.xml><?xml version="1.0" encoding="utf-8"?>
-<p:sld xmlns:a="http://schemas.openxmlformats.org/drawingml/2006/main" xmlns:r="http://schemas.openxmlformats.org/officeDocument/2006/relationships" xmlns:p="http://schemas.openxmlformats.org/presentationml/2006/main">
-  <p:cSld>
-    <p:spTree>
-      <p:nvGrpSpPr>
-        <p:cNvPr id="1" name=""/>
-        <p:cNvGrpSpPr/>
-        <p:nvPr/>
-      </p:nvGrpSpPr>
-      <p:grpSpPr>
-        <a:xfrm>
-          <a:off x="0" y="0"/>
-          <a:ext cx="0" cy="0"/>
-          <a:chOff x="0" y="0"/>
-          <a:chExt cx="0" cy="0"/>
-        </a:xfrm>
-      </p:grpSpPr>
-      <p:sp>
-        <p:nvSpPr>
-          <p:cNvPr id="2" name="Titre 1"/>
-          <p:cNvSpPr>
-            <a:spLocks noGrp="1"/>
-          </p:cNvSpPr>
-          <p:nvPr>
-            <p:ph type="title"/>
-          </p:nvPr>
-        </p:nvSpPr>
-        <p:spPr/>
-        <p:txBody>
-          <a:bodyPr/>
-          <a:lstStyle/>
-          <a:p>
-            <a:r>
-              <a:rPr lang="fr-FR" smtClean="0"/>
-              <a:t>TRASH</a:t>
-            </a:r>
-            <a:endParaRPr lang="fr-FR"/>
-          </a:p>
-        </p:txBody>
-      </p:sp>
-      <p:sp>
-        <p:nvSpPr>
-          <p:cNvPr id="3" name="Espace réservé du contenu 2"/>
-          <p:cNvSpPr>
-            <a:spLocks noGrp="1"/>
-          </p:cNvSpPr>
-          <p:nvPr>
-            <p:ph idx="1"/>
-          </p:nvPr>
-        </p:nvSpPr>
-        <p:spPr/>
-        <p:txBody>
-          <a:bodyPr/>
-          <a:lstStyle/>
-          <a:p>
-            <a:endParaRPr lang="fr-FR"/>
-          </a:p>
-        </p:txBody>
-      </p:sp>
-    </p:spTree>
-    <p:extLst>
-      <p:ext uri="{BB962C8B-B14F-4D97-AF65-F5344CB8AC3E}">
-        <p14:creationId xmlns:p14="http://schemas.microsoft.com/office/powerpoint/2010/main" val="3938449087"/>
-      </p:ext>
-    </p:extLst>
-  </p:cSld>
-  <p:clrMapOvr>
-    <a:masterClrMapping/>
-  </p:clrMapOvr>
-  <p:timing>
-    <p:tnLst>
-      <p:par>
-        <p:cTn xmlns:p14="http://schemas.microsoft.com/office/powerpoint/2010/main" id="1" dur="indefinite" restart="never" nodeType="tmRoot"/>
-      </p:par>
-    </p:tnLst>
-  </p:timing>
-</p:sld>
-</file>
-
-<file path=ppt/slides/slide3.xml><?xml version="1.0" encoding="utf-8"?>
-<p:sld xmlns:a="http://schemas.openxmlformats.org/drawingml/2006/main" xmlns:r="http://schemas.openxmlformats.org/officeDocument/2006/relationships" xmlns:p="http://schemas.openxmlformats.org/presentationml/2006/main">
-  <p:cSld>
-    <p:spTree>
-      <p:nvGrpSpPr>
-        <p:cNvPr id="1" name=""/>
-        <p:cNvGrpSpPr/>
-        <p:nvPr/>
-      </p:nvGrpSpPr>
-      <p:grpSpPr>
-        <a:xfrm>
-          <a:off x="0" y="0"/>
-          <a:ext cx="0" cy="0"/>
-          <a:chOff x="0" y="0"/>
-          <a:chExt cx="0" cy="0"/>
-        </a:xfrm>
-      </p:grpSpPr>
-      <p:sp>
-        <p:nvSpPr>
-          <p:cNvPr id="5" name="Espace réservé du contenu 4"/>
-          <p:cNvSpPr>
-            <a:spLocks noGrp="1"/>
-          </p:cNvSpPr>
-          <p:nvPr>
-            <p:ph idx="1"/>
-          </p:nvPr>
-        </p:nvSpPr>
-        <p:spPr>
-          <a:xfrm>
-            <a:off x="457199" y="814187"/>
-            <a:ext cx="8229600" cy="5336454"/>
-          </a:xfrm>
-        </p:spPr>
-        <p:txBody>
-          <a:bodyPr/>
-          <a:lstStyle/>
-          <a:p>
-            <a:pPr marL="0" indent="0">
-              <a:buNone/>
-            </a:pPr>
-            <a:r>
-              <a:rPr lang="en-US" dirty="0">
-                <a:latin typeface="Courier New" panose="02070309020205020404" pitchFamily="49" charset="0"/>
-                <a:cs typeface="Courier New" panose="02070309020205020404" pitchFamily="49" charset="0"/>
-              </a:rPr>
-              <a:t>note = 8</a:t>
-            </a:r>
-          </a:p>
-          <a:p>
-            <a:pPr marL="0" indent="0">
-              <a:buNone/>
-            </a:pPr>
-            <a:r>
-              <a:rPr lang="en-US" dirty="0">
-                <a:latin typeface="Courier New" panose="02070309020205020404" pitchFamily="49" charset="0"/>
-                <a:cs typeface="Courier New" panose="02070309020205020404" pitchFamily="49" charset="0"/>
-              </a:rPr>
-              <a:t>if note &gt; </a:t>
-            </a:r>
-            <a:r>
-              <a:rPr lang="en-US" dirty="0" smtClean="0">
-                <a:latin typeface="Courier New" panose="02070309020205020404" pitchFamily="49" charset="0"/>
-                <a:cs typeface="Courier New" panose="02070309020205020404" pitchFamily="49" charset="0"/>
-              </a:rPr>
-              <a:t>10</a:t>
-            </a:r>
-            <a:endParaRPr lang="en-US" dirty="0">
-              <a:latin typeface="Courier New" panose="02070309020205020404" pitchFamily="49" charset="0"/>
-              <a:cs typeface="Courier New" panose="02070309020205020404" pitchFamily="49" charset="0"/>
-            </a:endParaRPr>
-          </a:p>
-          <a:p>
-            <a:pPr marL="0" indent="0">
-              <a:buNone/>
-            </a:pPr>
-            <a:r>
-              <a:rPr lang="en-US" dirty="0">
-                <a:latin typeface="Courier New" panose="02070309020205020404" pitchFamily="49" charset="0"/>
-                <a:cs typeface="Courier New" panose="02070309020205020404" pitchFamily="49" charset="0"/>
-              </a:rPr>
-              <a:t>    print '</a:t>
-            </a:r>
-            <a:r>
-              <a:rPr lang="en-US" dirty="0" err="1">
-                <a:latin typeface="Courier New" panose="02070309020205020404" pitchFamily="49" charset="0"/>
-                <a:cs typeface="Courier New" panose="02070309020205020404" pitchFamily="49" charset="0"/>
-              </a:rPr>
-              <a:t>reçu</a:t>
-            </a:r>
-            <a:r>
-              <a:rPr lang="en-US" dirty="0">
-                <a:latin typeface="Courier New" panose="02070309020205020404" pitchFamily="49" charset="0"/>
-                <a:cs typeface="Courier New" panose="02070309020205020404" pitchFamily="49" charset="0"/>
-              </a:rPr>
-              <a:t>'</a:t>
-            </a:r>
-          </a:p>
-          <a:p>
-            <a:pPr marL="0" indent="0">
-              <a:buNone/>
-            </a:pPr>
-            <a:r>
-              <a:rPr lang="en-US" dirty="0">
-                <a:latin typeface="Courier New" panose="02070309020205020404" pitchFamily="49" charset="0"/>
-                <a:cs typeface="Courier New" panose="02070309020205020404" pitchFamily="49" charset="0"/>
-              </a:rPr>
-              <a:t>    print 'bravo !'</a:t>
-            </a:r>
-          </a:p>
-          <a:p>
-            <a:pPr marL="0" indent="0">
-              <a:buNone/>
-            </a:pPr>
-            <a:r>
-              <a:rPr lang="en-US" dirty="0" smtClean="0">
-                <a:latin typeface="Courier New" panose="02070309020205020404" pitchFamily="49" charset="0"/>
-                <a:cs typeface="Courier New" panose="02070309020205020404" pitchFamily="49" charset="0"/>
-              </a:rPr>
-              <a:t>else</a:t>
-            </a:r>
-            <a:endParaRPr lang="en-US" dirty="0">
-              <a:latin typeface="Courier New" panose="02070309020205020404" pitchFamily="49" charset="0"/>
-              <a:cs typeface="Courier New" panose="02070309020205020404" pitchFamily="49" charset="0"/>
-            </a:endParaRPr>
-          </a:p>
-          <a:p>
-            <a:pPr marL="0" indent="0">
-              <a:buNone/>
-            </a:pPr>
-            <a:r>
-              <a:rPr lang="en-US" dirty="0">
-                <a:latin typeface="Courier New" panose="02070309020205020404" pitchFamily="49" charset="0"/>
-                <a:cs typeface="Courier New" panose="02070309020205020404" pitchFamily="49" charset="0"/>
-              </a:rPr>
-              <a:t>    print '</a:t>
-            </a:r>
-            <a:r>
-              <a:rPr lang="en-US" dirty="0" err="1">
-                <a:latin typeface="Courier New" panose="02070309020205020404" pitchFamily="49" charset="0"/>
-                <a:cs typeface="Courier New" panose="02070309020205020404" pitchFamily="49" charset="0"/>
-              </a:rPr>
-              <a:t>recalé</a:t>
-            </a:r>
-            <a:r>
-              <a:rPr lang="en-US" dirty="0">
-                <a:latin typeface="Courier New" panose="02070309020205020404" pitchFamily="49" charset="0"/>
-                <a:cs typeface="Courier New" panose="02070309020205020404" pitchFamily="49" charset="0"/>
-              </a:rPr>
-              <a:t>'</a:t>
-            </a:r>
-          </a:p>
-          <a:p>
-            <a:pPr marL="0" indent="0">
-              <a:buNone/>
-            </a:pPr>
-            <a:endParaRPr lang="fr-FR" dirty="0">
-              <a:latin typeface="Courier New" panose="02070309020205020404" pitchFamily="49" charset="0"/>
-              <a:cs typeface="Courier New" panose="02070309020205020404" pitchFamily="49" charset="0"/>
-            </a:endParaRPr>
-          </a:p>
-        </p:txBody>
-      </p:sp>
-    </p:spTree>
-    <p:extLst>
-      <p:ext uri="{BB962C8B-B14F-4D97-AF65-F5344CB8AC3E}">
-        <p14:creationId xmlns:p14="http://schemas.microsoft.com/office/powerpoint/2010/main" val="773456290"/>
-      </p:ext>
-    </p:extLst>
-  </p:cSld>
-  <p:clrMapOvr>
-    <a:masterClrMapping/>
-  </p:clrMapOvr>
-  <p:timing>
-    <p:tnLst>
-      <p:par>
-        <p:cTn xmlns:p14="http://schemas.microsoft.com/office/powerpoint/2010/main" id="1" dur="indefinite" restart="never" nodeType="tmRoot"/>
-      </p:par>
-    </p:tnLst>
-  </p:timing>
-</p:sld>
-</file>
-
-<file path=ppt/slides/slide4.xml><?xml version="1.0" encoding="utf-8"?>
-<p:sld xmlns:a="http://schemas.openxmlformats.org/drawingml/2006/main" xmlns:r="http://schemas.openxmlformats.org/officeDocument/2006/relationships" xmlns:p="http://schemas.openxmlformats.org/presentationml/2006/main">
-  <p:cSld>
-    <p:spTree>
-      <p:nvGrpSpPr>
-        <p:cNvPr id="1" name=""/>
-        <p:cNvGrpSpPr/>
-        <p:nvPr/>
-      </p:nvGrpSpPr>
-      <p:grpSpPr>
-        <a:xfrm>
-          <a:off x="0" y="0"/>
-          <a:ext cx="0" cy="0"/>
-          <a:chOff x="0" y="0"/>
-          <a:chExt cx="0" cy="0"/>
-        </a:xfrm>
-      </p:grpSpPr>
-      <p:sp>
-        <p:nvSpPr>
-          <p:cNvPr id="5" name="Espace réservé du contenu 4"/>
-          <p:cNvSpPr>
-            <a:spLocks noGrp="1"/>
-          </p:cNvSpPr>
-          <p:nvPr>
-            <p:ph idx="1"/>
-          </p:nvPr>
-        </p:nvSpPr>
-        <p:spPr>
-          <a:xfrm>
-            <a:off x="457199" y="814187"/>
-            <a:ext cx="8229600" cy="5336454"/>
-          </a:xfrm>
-        </p:spPr>
-        <p:txBody>
-          <a:bodyPr/>
-          <a:lstStyle/>
-          <a:p>
-            <a:pPr marL="0" indent="0">
-              <a:buNone/>
-            </a:pPr>
-            <a:r>
-              <a:rPr lang="en-US" dirty="0">
-                <a:latin typeface="Courier New" panose="02070309020205020404" pitchFamily="49" charset="0"/>
-                <a:cs typeface="Courier New" panose="02070309020205020404" pitchFamily="49" charset="0"/>
-              </a:rPr>
-              <a:t>note = 8</a:t>
-            </a:r>
-          </a:p>
-          <a:p>
-            <a:pPr marL="0" indent="0">
-              <a:buNone/>
-            </a:pPr>
-            <a:r>
-              <a:rPr lang="en-US" dirty="0">
-                <a:latin typeface="Courier New" panose="02070309020205020404" pitchFamily="49" charset="0"/>
-                <a:cs typeface="Courier New" panose="02070309020205020404" pitchFamily="49" charset="0"/>
-              </a:rPr>
-              <a:t>if note &gt; 10:</a:t>
-            </a:r>
-          </a:p>
-          <a:p>
-            <a:pPr marL="0" indent="0">
-              <a:buNone/>
-            </a:pPr>
-            <a:r>
-              <a:rPr lang="en-US" dirty="0">
-                <a:latin typeface="Courier New" panose="02070309020205020404" pitchFamily="49" charset="0"/>
-                <a:cs typeface="Courier New" panose="02070309020205020404" pitchFamily="49" charset="0"/>
-              </a:rPr>
-              <a:t>    print '</a:t>
-            </a:r>
-            <a:r>
-              <a:rPr lang="en-US" dirty="0" err="1">
-                <a:latin typeface="Courier New" panose="02070309020205020404" pitchFamily="49" charset="0"/>
-                <a:cs typeface="Courier New" panose="02070309020205020404" pitchFamily="49" charset="0"/>
-              </a:rPr>
-              <a:t>reçu</a:t>
-            </a:r>
-            <a:r>
-              <a:rPr lang="en-US" dirty="0">
-                <a:latin typeface="Courier New" panose="02070309020205020404" pitchFamily="49" charset="0"/>
-                <a:cs typeface="Courier New" panose="02070309020205020404" pitchFamily="49" charset="0"/>
-              </a:rPr>
-              <a:t>'</a:t>
-            </a:r>
-          </a:p>
-          <a:p>
-            <a:pPr marL="0" indent="0">
-              <a:buNone/>
-            </a:pPr>
-            <a:r>
-              <a:rPr lang="en-US" dirty="0">
-                <a:latin typeface="Courier New" panose="02070309020205020404" pitchFamily="49" charset="0"/>
-                <a:cs typeface="Courier New" panose="02070309020205020404" pitchFamily="49" charset="0"/>
-              </a:rPr>
-              <a:t>    print 'bravo !'</a:t>
-            </a:r>
-          </a:p>
-          <a:p>
-            <a:pPr marL="0" indent="0">
-              <a:buNone/>
-            </a:pPr>
-            <a:r>
-              <a:rPr lang="en-US" dirty="0">
-                <a:latin typeface="Courier New" panose="02070309020205020404" pitchFamily="49" charset="0"/>
-                <a:cs typeface="Courier New" panose="02070309020205020404" pitchFamily="49" charset="0"/>
-              </a:rPr>
-              <a:t>else:</a:t>
-            </a:r>
-          </a:p>
-          <a:p>
-            <a:pPr marL="0" indent="0">
-              <a:buNone/>
-            </a:pPr>
-            <a:r>
-              <a:rPr lang="en-US" dirty="0">
-                <a:latin typeface="Courier New" panose="02070309020205020404" pitchFamily="49" charset="0"/>
-                <a:cs typeface="Courier New" panose="02070309020205020404" pitchFamily="49" charset="0"/>
-              </a:rPr>
-              <a:t>    print '</a:t>
-            </a:r>
-            <a:r>
-              <a:rPr lang="en-US" dirty="0" err="1">
-                <a:latin typeface="Courier New" panose="02070309020205020404" pitchFamily="49" charset="0"/>
-                <a:cs typeface="Courier New" panose="02070309020205020404" pitchFamily="49" charset="0"/>
-              </a:rPr>
-              <a:t>recalé</a:t>
-            </a:r>
-            <a:r>
-              <a:rPr lang="en-US" dirty="0">
-                <a:latin typeface="Courier New" panose="02070309020205020404" pitchFamily="49" charset="0"/>
-                <a:cs typeface="Courier New" panose="02070309020205020404" pitchFamily="49" charset="0"/>
-              </a:rPr>
-              <a:t>'</a:t>
-            </a:r>
-          </a:p>
-          <a:p>
-            <a:pPr marL="0" indent="0">
-              <a:buNone/>
-            </a:pPr>
-            <a:endParaRPr lang="fr-FR" dirty="0">
-              <a:latin typeface="Courier New" panose="02070309020205020404" pitchFamily="49" charset="0"/>
-              <a:cs typeface="Courier New" panose="02070309020205020404" pitchFamily="49" charset="0"/>
-            </a:endParaRPr>
-          </a:p>
-        </p:txBody>
-      </p:sp>
-    </p:spTree>
-    <p:extLst>
-      <p:ext uri="{BB962C8B-B14F-4D97-AF65-F5344CB8AC3E}">
-        <p14:creationId xmlns:p14="http://schemas.microsoft.com/office/powerpoint/2010/main" val="2524485542"/>
-      </p:ext>
-    </p:extLst>
-  </p:cSld>
-  <p:clrMapOvr>
-    <a:masterClrMapping/>
-  </p:clrMapOvr>
-  <p:timing>
-    <p:tnLst>
-      <p:par>
-        <p:cTn xmlns:p14="http://schemas.microsoft.com/office/powerpoint/2010/main" id="1" dur="indefinite" restart="never" nodeType="tmRoot"/>
-      </p:par>
-    </p:tnLst>
-  </p:timing>
-</p:sld>
-</file>
-
-<file path=ppt/slides/slide5.xml><?xml version="1.0" encoding="utf-8"?>
-<p:sld xmlns:a="http://schemas.openxmlformats.org/drawingml/2006/main" xmlns:r="http://schemas.openxmlformats.org/officeDocument/2006/relationships" xmlns:p="http://schemas.openxmlformats.org/presentationml/2006/main">
-  <p:cSld>
-    <p:spTree>
-      <p:nvGrpSpPr>
-        <p:cNvPr id="1" name=""/>
-        <p:cNvGrpSpPr/>
-        <p:nvPr/>
-      </p:nvGrpSpPr>
-      <p:grpSpPr>
-        <a:xfrm>
-          <a:off x="0" y="0"/>
-          <a:ext cx="0" cy="0"/>
-          <a:chOff x="0" y="0"/>
-          <a:chExt cx="0" cy="0"/>
-        </a:xfrm>
-      </p:grpSpPr>
-      <p:sp>
-        <p:nvSpPr>
-          <p:cNvPr id="5" name="Espace réservé du contenu 4"/>
-          <p:cNvSpPr>
-            <a:spLocks noGrp="1"/>
-          </p:cNvSpPr>
-          <p:nvPr>
-            <p:ph idx="1"/>
-          </p:nvPr>
-        </p:nvSpPr>
-        <p:spPr>
-          <a:xfrm>
-            <a:off x="457199" y="814187"/>
-            <a:ext cx="8229600" cy="5336454"/>
-          </a:xfrm>
-        </p:spPr>
-        <p:txBody>
-          <a:bodyPr/>
-          <a:lstStyle/>
-          <a:p>
-            <a:pPr marL="0" indent="0">
-              <a:buNone/>
-            </a:pPr>
-            <a:r>
-              <a:rPr lang="en-US" dirty="0">
-                <a:latin typeface="Courier New" panose="02070309020205020404" pitchFamily="49" charset="0"/>
-                <a:cs typeface="Courier New" panose="02070309020205020404" pitchFamily="49" charset="0"/>
-              </a:rPr>
-              <a:t>note = </a:t>
-            </a:r>
-            <a:r>
-              <a:rPr lang="en-US" dirty="0" smtClean="0">
-                <a:latin typeface="Courier New" panose="02070309020205020404" pitchFamily="49" charset="0"/>
-                <a:cs typeface="Courier New" panose="02070309020205020404" pitchFamily="49" charset="0"/>
-              </a:rPr>
-              <a:t>8;</a:t>
-            </a:r>
-            <a:endParaRPr lang="en-US" dirty="0">
-              <a:latin typeface="Courier New" panose="02070309020205020404" pitchFamily="49" charset="0"/>
-              <a:cs typeface="Courier New" panose="02070309020205020404" pitchFamily="49" charset="0"/>
-            </a:endParaRPr>
-          </a:p>
-          <a:p>
-            <a:pPr marL="0" indent="0">
-              <a:buNone/>
-            </a:pPr>
-            <a:r>
-              <a:rPr lang="en-US" dirty="0">
-                <a:latin typeface="Courier New" panose="02070309020205020404" pitchFamily="49" charset="0"/>
-                <a:cs typeface="Courier New" panose="02070309020205020404" pitchFamily="49" charset="0"/>
-              </a:rPr>
-              <a:t>if note &gt; </a:t>
-            </a:r>
-            <a:r>
-              <a:rPr lang="en-US" dirty="0" smtClean="0">
-                <a:latin typeface="Courier New" panose="02070309020205020404" pitchFamily="49" charset="0"/>
-                <a:cs typeface="Courier New" panose="02070309020205020404" pitchFamily="49" charset="0"/>
-              </a:rPr>
-              <a:t>10 {</a:t>
-            </a:r>
-            <a:endParaRPr lang="en-US" dirty="0">
-              <a:latin typeface="Courier New" panose="02070309020205020404" pitchFamily="49" charset="0"/>
-              <a:cs typeface="Courier New" panose="02070309020205020404" pitchFamily="49" charset="0"/>
-            </a:endParaRPr>
-          </a:p>
-          <a:p>
-            <a:pPr marL="0" indent="0">
-              <a:buNone/>
-            </a:pPr>
-            <a:r>
-              <a:rPr lang="en-US" dirty="0">
-                <a:latin typeface="Courier New" panose="02070309020205020404" pitchFamily="49" charset="0"/>
-                <a:cs typeface="Courier New" panose="02070309020205020404" pitchFamily="49" charset="0"/>
-              </a:rPr>
-              <a:t>    print </a:t>
-            </a:r>
-            <a:r>
-              <a:rPr lang="en-US" dirty="0" smtClean="0">
-                <a:latin typeface="Courier New" panose="02070309020205020404" pitchFamily="49" charset="0"/>
-                <a:cs typeface="Courier New" panose="02070309020205020404" pitchFamily="49" charset="0"/>
-              </a:rPr>
-              <a:t>'</a:t>
-            </a:r>
-            <a:r>
-              <a:rPr lang="en-US" dirty="0" err="1" smtClean="0">
-                <a:latin typeface="Courier New" panose="02070309020205020404" pitchFamily="49" charset="0"/>
-                <a:cs typeface="Courier New" panose="02070309020205020404" pitchFamily="49" charset="0"/>
-              </a:rPr>
-              <a:t>reçu</a:t>
-            </a:r>
-            <a:r>
-              <a:rPr lang="en-US" dirty="0" smtClean="0">
-                <a:latin typeface="Courier New" panose="02070309020205020404" pitchFamily="49" charset="0"/>
-                <a:cs typeface="Courier New" panose="02070309020205020404" pitchFamily="49" charset="0"/>
-              </a:rPr>
-              <a:t>';</a:t>
-            </a:r>
-            <a:endParaRPr lang="en-US" dirty="0">
-              <a:latin typeface="Courier New" panose="02070309020205020404" pitchFamily="49" charset="0"/>
-              <a:cs typeface="Courier New" panose="02070309020205020404" pitchFamily="49" charset="0"/>
-            </a:endParaRPr>
-          </a:p>
-          <a:p>
-            <a:pPr marL="0" indent="0">
-              <a:buNone/>
-            </a:pPr>
-            <a:r>
-              <a:rPr lang="en-US" dirty="0">
-                <a:latin typeface="Courier New" panose="02070309020205020404" pitchFamily="49" charset="0"/>
-                <a:cs typeface="Courier New" panose="02070309020205020404" pitchFamily="49" charset="0"/>
-              </a:rPr>
-              <a:t>    print 'bravo </a:t>
-            </a:r>
-            <a:r>
-              <a:rPr lang="en-US" dirty="0" smtClean="0">
-                <a:latin typeface="Courier New" panose="02070309020205020404" pitchFamily="49" charset="0"/>
-                <a:cs typeface="Courier New" panose="02070309020205020404" pitchFamily="49" charset="0"/>
-              </a:rPr>
-              <a:t>!';}</a:t>
-            </a:r>
-            <a:endParaRPr lang="en-US" dirty="0">
-              <a:latin typeface="Courier New" panose="02070309020205020404" pitchFamily="49" charset="0"/>
-              <a:cs typeface="Courier New" panose="02070309020205020404" pitchFamily="49" charset="0"/>
-            </a:endParaRPr>
-          </a:p>
-          <a:p>
-            <a:pPr marL="0" indent="0">
-              <a:buNone/>
-            </a:pPr>
-            <a:r>
-              <a:rPr lang="en-US" dirty="0" smtClean="0">
-                <a:latin typeface="Courier New" panose="02070309020205020404" pitchFamily="49" charset="0"/>
-                <a:cs typeface="Courier New" panose="02070309020205020404" pitchFamily="49" charset="0"/>
-              </a:rPr>
-              <a:t>else {</a:t>
-            </a:r>
-            <a:endParaRPr lang="en-US" dirty="0">
-              <a:latin typeface="Courier New" panose="02070309020205020404" pitchFamily="49" charset="0"/>
-              <a:cs typeface="Courier New" panose="02070309020205020404" pitchFamily="49" charset="0"/>
-            </a:endParaRPr>
-          </a:p>
-          <a:p>
-            <a:pPr marL="0" indent="0">
-              <a:buNone/>
-            </a:pPr>
-            <a:r>
-              <a:rPr lang="en-US" dirty="0">
-                <a:latin typeface="Courier New" panose="02070309020205020404" pitchFamily="49" charset="0"/>
-                <a:cs typeface="Courier New" panose="02070309020205020404" pitchFamily="49" charset="0"/>
-              </a:rPr>
-              <a:t>    print </a:t>
-            </a:r>
-            <a:r>
-              <a:rPr lang="en-US" dirty="0" smtClean="0">
-                <a:latin typeface="Courier New" panose="02070309020205020404" pitchFamily="49" charset="0"/>
-                <a:cs typeface="Courier New" panose="02070309020205020404" pitchFamily="49" charset="0"/>
-              </a:rPr>
-              <a:t>'</a:t>
-            </a:r>
-            <a:r>
-              <a:rPr lang="en-US" dirty="0" err="1" smtClean="0">
-                <a:latin typeface="Courier New" panose="02070309020205020404" pitchFamily="49" charset="0"/>
-                <a:cs typeface="Courier New" panose="02070309020205020404" pitchFamily="49" charset="0"/>
-              </a:rPr>
-              <a:t>recalé</a:t>
-            </a:r>
-            <a:r>
-              <a:rPr lang="en-US" dirty="0" smtClean="0">
-                <a:latin typeface="Courier New" panose="02070309020205020404" pitchFamily="49" charset="0"/>
-                <a:cs typeface="Courier New" panose="02070309020205020404" pitchFamily="49" charset="0"/>
-              </a:rPr>
-              <a:t>';}</a:t>
-            </a:r>
-            <a:endParaRPr lang="en-US" dirty="0">
-              <a:latin typeface="Courier New" panose="02070309020205020404" pitchFamily="49" charset="0"/>
-              <a:cs typeface="Courier New" panose="02070309020205020404" pitchFamily="49" charset="0"/>
-            </a:endParaRPr>
-          </a:p>
-          <a:p>
-            <a:pPr marL="0" indent="0">
-              <a:buNone/>
-            </a:pPr>
-            <a:endParaRPr lang="fr-FR" dirty="0">
-              <a:latin typeface="Courier New" panose="02070309020205020404" pitchFamily="49" charset="0"/>
-              <a:cs typeface="Courier New" panose="02070309020205020404" pitchFamily="49" charset="0"/>
-            </a:endParaRPr>
-          </a:p>
-        </p:txBody>
-      </p:sp>
-    </p:spTree>
-    <p:extLst>
-      <p:ext uri="{BB962C8B-B14F-4D97-AF65-F5344CB8AC3E}">
-        <p14:creationId xmlns:p14="http://schemas.microsoft.com/office/powerpoint/2010/main" val="1492898247"/>
-      </p:ext>
-    </p:extLst>
-  </p:cSld>
-  <p:clrMapOvr>
-    <a:masterClrMapping/>
-  </p:clrMapOvr>
-  <p:timing>
-    <p:tnLst>
-      <p:par>
-        <p:cTn xmlns:p14="http://schemas.microsoft.com/office/powerpoint/2010/main" id="1" dur="indefinite" restart="never" nodeType="tmRoot"/>
-      </p:par>
-    </p:tnLst>
-  </p:timing>
-</p:sld>
-</file>
-
-<file path=ppt/slides/slide6.xml><?xml version="1.0" encoding="utf-8"?>
-<p:sld xmlns:a="http://schemas.openxmlformats.org/drawingml/2006/main" xmlns:r="http://schemas.openxmlformats.org/officeDocument/2006/relationships" xmlns:p="http://schemas.openxmlformats.org/presentationml/2006/main">
-  <p:cSld>
-    <p:spTree>
-      <p:nvGrpSpPr>
-        <p:cNvPr id="1" name=""/>
-        <p:cNvGrpSpPr/>
-        <p:nvPr/>
-      </p:nvGrpSpPr>
-      <p:grpSpPr>
-        <a:xfrm>
-          <a:off x="0" y="0"/>
-          <a:ext cx="0" cy="0"/>
-          <a:chOff x="0" y="0"/>
-          <a:chExt cx="0" cy="0"/>
-        </a:xfrm>
-      </p:grpSpPr>
-      <p:sp>
-        <p:nvSpPr>
-          <p:cNvPr id="5" name="Espace réservé du contenu 4"/>
-          <p:cNvSpPr>
-            <a:spLocks noGrp="1"/>
-          </p:cNvSpPr>
-          <p:nvPr>
-            <p:ph idx="1"/>
-          </p:nvPr>
-        </p:nvSpPr>
-        <p:spPr>
-          <a:xfrm>
-            <a:off x="457199" y="814187"/>
-            <a:ext cx="8229600" cy="5336454"/>
-          </a:xfrm>
-        </p:spPr>
-        <p:txBody>
-          <a:bodyPr/>
-          <a:lstStyle/>
-          <a:p>
-            <a:pPr marL="0" indent="0">
-              <a:buNone/>
-            </a:pPr>
-            <a:r>
-              <a:rPr lang="en-US" dirty="0">
-                <a:latin typeface="Courier New" panose="02070309020205020404" pitchFamily="49" charset="0"/>
-                <a:cs typeface="Courier New" panose="02070309020205020404" pitchFamily="49" charset="0"/>
-              </a:rPr>
-              <a:t>note = </a:t>
-            </a:r>
-            <a:r>
-              <a:rPr lang="en-US" dirty="0" smtClean="0">
-                <a:latin typeface="Courier New" panose="02070309020205020404" pitchFamily="49" charset="0"/>
-                <a:cs typeface="Courier New" panose="02070309020205020404" pitchFamily="49" charset="0"/>
-              </a:rPr>
-              <a:t>8;</a:t>
-            </a:r>
-            <a:endParaRPr lang="en-US" dirty="0">
-              <a:latin typeface="Courier New" panose="02070309020205020404" pitchFamily="49" charset="0"/>
-              <a:cs typeface="Courier New" panose="02070309020205020404" pitchFamily="49" charset="0"/>
-            </a:endParaRPr>
-          </a:p>
-          <a:p>
-            <a:pPr marL="0" indent="0">
-              <a:buNone/>
-            </a:pPr>
-            <a:r>
-              <a:rPr lang="en-US" dirty="0">
-                <a:latin typeface="Courier New" panose="02070309020205020404" pitchFamily="49" charset="0"/>
-                <a:cs typeface="Courier New" panose="02070309020205020404" pitchFamily="49" charset="0"/>
-              </a:rPr>
-              <a:t>if note &gt; </a:t>
-            </a:r>
-            <a:r>
-              <a:rPr lang="en-US" dirty="0" smtClean="0">
-                <a:latin typeface="Courier New" panose="02070309020205020404" pitchFamily="49" charset="0"/>
-                <a:cs typeface="Courier New" panose="02070309020205020404" pitchFamily="49" charset="0"/>
-              </a:rPr>
-              <a:t>10 </a:t>
-            </a:r>
-          </a:p>
-          <a:p>
-            <a:pPr marL="0" indent="0">
-              <a:buNone/>
-            </a:pPr>
-            <a:r>
-              <a:rPr lang="en-US" dirty="0">
-                <a:latin typeface="Courier New" panose="02070309020205020404" pitchFamily="49" charset="0"/>
-                <a:cs typeface="Courier New" panose="02070309020205020404" pitchFamily="49" charset="0"/>
-              </a:rPr>
-              <a:t> </a:t>
-            </a:r>
-            <a:r>
-              <a:rPr lang="en-US" dirty="0" smtClean="0">
-                <a:latin typeface="Courier New" panose="02070309020205020404" pitchFamily="49" charset="0"/>
-                <a:cs typeface="Courier New" panose="02070309020205020404" pitchFamily="49" charset="0"/>
-              </a:rPr>
-              <a:t>   {</a:t>
-            </a:r>
-            <a:endParaRPr lang="en-US" dirty="0">
-              <a:latin typeface="Courier New" panose="02070309020205020404" pitchFamily="49" charset="0"/>
-              <a:cs typeface="Courier New" panose="02070309020205020404" pitchFamily="49" charset="0"/>
-            </a:endParaRPr>
-          </a:p>
-          <a:p>
-            <a:pPr marL="0" indent="0">
-              <a:buNone/>
-            </a:pPr>
-            <a:r>
-              <a:rPr lang="en-US" dirty="0">
-                <a:latin typeface="Courier New" panose="02070309020205020404" pitchFamily="49" charset="0"/>
-                <a:cs typeface="Courier New" panose="02070309020205020404" pitchFamily="49" charset="0"/>
-              </a:rPr>
-              <a:t>    print </a:t>
-            </a:r>
-            <a:r>
-              <a:rPr lang="en-US" dirty="0" smtClean="0">
-                <a:latin typeface="Courier New" panose="02070309020205020404" pitchFamily="49" charset="0"/>
-                <a:cs typeface="Courier New" panose="02070309020205020404" pitchFamily="49" charset="0"/>
-              </a:rPr>
-              <a:t>'</a:t>
-            </a:r>
-            <a:r>
-              <a:rPr lang="en-US" dirty="0" err="1" smtClean="0">
-                <a:latin typeface="Courier New" panose="02070309020205020404" pitchFamily="49" charset="0"/>
-                <a:cs typeface="Courier New" panose="02070309020205020404" pitchFamily="49" charset="0"/>
-              </a:rPr>
-              <a:t>reçu</a:t>
-            </a:r>
-            <a:r>
-              <a:rPr lang="en-US" dirty="0" smtClean="0">
-                <a:latin typeface="Courier New" panose="02070309020205020404" pitchFamily="49" charset="0"/>
-                <a:cs typeface="Courier New" panose="02070309020205020404" pitchFamily="49" charset="0"/>
-              </a:rPr>
-              <a:t>';</a:t>
-            </a:r>
-            <a:endParaRPr lang="en-US" dirty="0">
-              <a:latin typeface="Courier New" panose="02070309020205020404" pitchFamily="49" charset="0"/>
-              <a:cs typeface="Courier New" panose="02070309020205020404" pitchFamily="49" charset="0"/>
-            </a:endParaRPr>
-          </a:p>
-          <a:p>
-            <a:pPr marL="0" indent="0">
-              <a:buNone/>
-            </a:pPr>
-            <a:r>
-              <a:rPr lang="en-US" dirty="0">
-                <a:latin typeface="Courier New" panose="02070309020205020404" pitchFamily="49" charset="0"/>
-                <a:cs typeface="Courier New" panose="02070309020205020404" pitchFamily="49" charset="0"/>
-              </a:rPr>
-              <a:t>    print 'bravo </a:t>
-            </a:r>
-            <a:r>
-              <a:rPr lang="en-US" dirty="0" smtClean="0">
-                <a:latin typeface="Courier New" panose="02070309020205020404" pitchFamily="49" charset="0"/>
-                <a:cs typeface="Courier New" panose="02070309020205020404" pitchFamily="49" charset="0"/>
-              </a:rPr>
-              <a:t>!';</a:t>
-            </a:r>
-          </a:p>
-          <a:p>
-            <a:pPr marL="0" indent="0">
-              <a:buNone/>
-            </a:pPr>
-            <a:r>
-              <a:rPr lang="en-US" dirty="0">
-                <a:latin typeface="Courier New" panose="02070309020205020404" pitchFamily="49" charset="0"/>
-                <a:cs typeface="Courier New" panose="02070309020205020404" pitchFamily="49" charset="0"/>
-              </a:rPr>
-              <a:t> </a:t>
-            </a:r>
-            <a:r>
-              <a:rPr lang="en-US" dirty="0" smtClean="0">
-                <a:latin typeface="Courier New" panose="02070309020205020404" pitchFamily="49" charset="0"/>
-                <a:cs typeface="Courier New" panose="02070309020205020404" pitchFamily="49" charset="0"/>
-              </a:rPr>
-              <a:t>   }</a:t>
-            </a:r>
-            <a:endParaRPr lang="en-US" dirty="0">
-              <a:latin typeface="Courier New" panose="02070309020205020404" pitchFamily="49" charset="0"/>
-              <a:cs typeface="Courier New" panose="02070309020205020404" pitchFamily="49" charset="0"/>
-            </a:endParaRPr>
-          </a:p>
-          <a:p>
-            <a:pPr marL="0" indent="0">
-              <a:buNone/>
-            </a:pPr>
-            <a:r>
-              <a:rPr lang="en-US" dirty="0" smtClean="0">
-                <a:latin typeface="Courier New" panose="02070309020205020404" pitchFamily="49" charset="0"/>
-                <a:cs typeface="Courier New" panose="02070309020205020404" pitchFamily="49" charset="0"/>
-              </a:rPr>
-              <a:t>else </a:t>
-            </a:r>
-          </a:p>
-          <a:p>
-            <a:pPr marL="0" indent="0">
-              <a:buNone/>
-            </a:pPr>
-            <a:r>
-              <a:rPr lang="en-US" dirty="0">
-                <a:latin typeface="Courier New" panose="02070309020205020404" pitchFamily="49" charset="0"/>
-                <a:cs typeface="Courier New" panose="02070309020205020404" pitchFamily="49" charset="0"/>
-              </a:rPr>
-              <a:t> </a:t>
-            </a:r>
-            <a:r>
-              <a:rPr lang="en-US" dirty="0" smtClean="0">
-                <a:latin typeface="Courier New" panose="02070309020205020404" pitchFamily="49" charset="0"/>
-                <a:cs typeface="Courier New" panose="02070309020205020404" pitchFamily="49" charset="0"/>
-              </a:rPr>
-              <a:t>   {</a:t>
-            </a:r>
-            <a:endParaRPr lang="en-US" dirty="0">
-              <a:latin typeface="Courier New" panose="02070309020205020404" pitchFamily="49" charset="0"/>
-              <a:cs typeface="Courier New" panose="02070309020205020404" pitchFamily="49" charset="0"/>
-            </a:endParaRPr>
-          </a:p>
-          <a:p>
-            <a:pPr marL="0" indent="0">
-              <a:buNone/>
-            </a:pPr>
-            <a:r>
-              <a:rPr lang="en-US" dirty="0">
-                <a:latin typeface="Courier New" panose="02070309020205020404" pitchFamily="49" charset="0"/>
-                <a:cs typeface="Courier New" panose="02070309020205020404" pitchFamily="49" charset="0"/>
-              </a:rPr>
-              <a:t>    print </a:t>
-            </a:r>
-            <a:r>
-              <a:rPr lang="en-US" dirty="0" smtClean="0">
-                <a:latin typeface="Courier New" panose="02070309020205020404" pitchFamily="49" charset="0"/>
-                <a:cs typeface="Courier New" panose="02070309020205020404" pitchFamily="49" charset="0"/>
-              </a:rPr>
-              <a:t>'</a:t>
-            </a:r>
-            <a:r>
-              <a:rPr lang="en-US" dirty="0" err="1" smtClean="0">
-                <a:latin typeface="Courier New" panose="02070309020205020404" pitchFamily="49" charset="0"/>
-                <a:cs typeface="Courier New" panose="02070309020205020404" pitchFamily="49" charset="0"/>
-              </a:rPr>
-              <a:t>recalé</a:t>
-            </a:r>
-            <a:r>
-              <a:rPr lang="en-US" dirty="0" smtClean="0">
-                <a:latin typeface="Courier New" panose="02070309020205020404" pitchFamily="49" charset="0"/>
-                <a:cs typeface="Courier New" panose="02070309020205020404" pitchFamily="49" charset="0"/>
-              </a:rPr>
-              <a:t>';</a:t>
-            </a:r>
-          </a:p>
-          <a:p>
-            <a:pPr marL="0" indent="0">
-              <a:buNone/>
-            </a:pPr>
-            <a:r>
-              <a:rPr lang="en-US" dirty="0">
-                <a:latin typeface="Courier New" panose="02070309020205020404" pitchFamily="49" charset="0"/>
-                <a:cs typeface="Courier New" panose="02070309020205020404" pitchFamily="49" charset="0"/>
-              </a:rPr>
-              <a:t> </a:t>
-            </a:r>
-            <a:r>
-              <a:rPr lang="en-US" dirty="0" smtClean="0">
-                <a:latin typeface="Courier New" panose="02070309020205020404" pitchFamily="49" charset="0"/>
-                <a:cs typeface="Courier New" panose="02070309020205020404" pitchFamily="49" charset="0"/>
-              </a:rPr>
-              <a:t>   }</a:t>
-            </a:r>
-            <a:endParaRPr lang="en-US" dirty="0">
-              <a:latin typeface="Courier New" panose="02070309020205020404" pitchFamily="49" charset="0"/>
-              <a:cs typeface="Courier New" panose="02070309020205020404" pitchFamily="49" charset="0"/>
-            </a:endParaRPr>
-          </a:p>
-          <a:p>
-            <a:pPr marL="0" indent="0">
-              <a:buNone/>
-            </a:pPr>
-            <a:endParaRPr lang="fr-FR" dirty="0">
-              <a:latin typeface="Courier New" panose="02070309020205020404" pitchFamily="49" charset="0"/>
-              <a:cs typeface="Courier New" panose="02070309020205020404" pitchFamily="49" charset="0"/>
-            </a:endParaRPr>
-          </a:p>
-        </p:txBody>
-      </p:sp>
-    </p:spTree>
-    <p:extLst>
-      <p:ext uri="{BB962C8B-B14F-4D97-AF65-F5344CB8AC3E}">
-        <p14:creationId xmlns:p14="http://schemas.microsoft.com/office/powerpoint/2010/main" val="62898452"/>
-      </p:ext>
-    </p:extLst>
-  </p:cSld>
-  <p:clrMapOvr>
-    <a:masterClrMapping/>
-  </p:clrMapOvr>
-  <p:timing>
-    <p:tnLst>
-      <p:par>
-        <p:cTn xmlns:p14="http://schemas.microsoft.com/office/powerpoint/2010/main" id="1" dur="indefinite" restart="never" nodeType="tmRoot"/>
-      </p:par>
-    </p:tnLst>
   </p:timing>
 </p:sld>
 </file>

</xml_diff>

<commit_message>
added W3 video 3 on if updated video 2 with the line limit recommendation of 79 chars updated W2 V6 Slide1 to use the same colors as IDLE
</commit_message>
<xml_diff>
--- a/semaine2/CO12AL-W2-VIDEO06-SLIDE01.pptx
+++ b/semaine2/CO12AL-W2-VIDEO06-SLIDE01.pptx
@@ -577,7 +577,7 @@
           </a:ln>
           <a:extLst>
             <a:ext uri="{909E8E84-426E-40dd-AFC4-6F175D3DCCD1}">
-              <a14:hiddenFill xmlns:a14="http://schemas.microsoft.com/office/drawing/2010/main" xmlns="">
+              <a14:hiddenFill xmlns="" xmlns:a14="http://schemas.microsoft.com/office/drawing/2010/main">
                 <a:solidFill>
                   <a:srgbClr val="FFFFFF"/>
                 </a:solidFill>
@@ -3743,14 +3743,14 @@
           </a:ln>
           <a:extLst>
             <a:ext uri="{909E8E84-426E-40dd-AFC4-6F175D3DCCD1}">
-              <a14:hiddenFill xmlns:a14="http://schemas.microsoft.com/office/drawing/2010/main" xmlns="">
+              <a14:hiddenFill xmlns="" xmlns:a14="http://schemas.microsoft.com/office/drawing/2010/main">
                 <a:solidFill>
                   <a:srgbClr val="FFFFFF"/>
                 </a:solidFill>
               </a14:hiddenFill>
             </a:ext>
             <a:ext uri="{91240B29-F687-4f45-9708-019B960494DF}">
-              <a14:hiddenLine xmlns:a14="http://schemas.microsoft.com/office/drawing/2010/main" xmlns="" w="9525">
+              <a14:hiddenLine xmlns="" xmlns:a14="http://schemas.microsoft.com/office/drawing/2010/main" w="9525">
                 <a:solidFill>
                   <a:srgbClr val="000000"/>
                 </a:solidFill>
@@ -3801,14 +3801,14 @@
           </a:ln>
           <a:extLst>
             <a:ext uri="{909E8E84-426E-40dd-AFC4-6F175D3DCCD1}">
-              <a14:hiddenFill xmlns:a14="http://schemas.microsoft.com/office/drawing/2010/main" xmlns="">
+              <a14:hiddenFill xmlns="" xmlns:a14="http://schemas.microsoft.com/office/drawing/2010/main">
                 <a:solidFill>
                   <a:srgbClr val="FFFFFF"/>
                 </a:solidFill>
               </a14:hiddenFill>
             </a:ext>
             <a:ext uri="{91240B29-F687-4f45-9708-019B960494DF}">
-              <a14:hiddenLine xmlns:a14="http://schemas.microsoft.com/office/drawing/2010/main" xmlns="" w="9525">
+              <a14:hiddenLine xmlns="" xmlns:a14="http://schemas.microsoft.com/office/drawing/2010/main" w="9525">
                 <a:solidFill>
                   <a:srgbClr val="000000"/>
                 </a:solidFill>
@@ -4438,25 +4438,65 @@
             </a:pPr>
             <a:r>
               <a:rPr lang="en-US" dirty="0">
+                <a:solidFill>
+                  <a:srgbClr val="FFC000"/>
+                </a:solidFill>
                 <a:latin typeface="Courier New" panose="02070309020205020404" pitchFamily="49" charset="0"/>
                 <a:cs typeface="Courier New" panose="02070309020205020404" pitchFamily="49" charset="0"/>
               </a:rPr>
-              <a:t>if note &gt; 10:</a:t>
-            </a:r>
-          </a:p>
-          <a:p>
-            <a:pPr marL="0" indent="0">
-              <a:buNone/>
-            </a:pPr>
+              <a:t>if</a:t>
+            </a:r>
             <a:r>
               <a:rPr lang="en-US" dirty="0">
                 <a:latin typeface="Courier New" panose="02070309020205020404" pitchFamily="49" charset="0"/>
                 <a:cs typeface="Courier New" panose="02070309020205020404" pitchFamily="49" charset="0"/>
               </a:rPr>
-              <a:t>    print '</a:t>
+              <a:t> note &gt; 10:</a:t>
+            </a:r>
+          </a:p>
+          <a:p>
+            <a:pPr marL="0" indent="0">
+              <a:buNone/>
+            </a:pPr>
+            <a:r>
+              <a:rPr lang="en-US" dirty="0">
+                <a:latin typeface="Courier New" panose="02070309020205020404" pitchFamily="49" charset="0"/>
+                <a:cs typeface="Courier New" panose="02070309020205020404" pitchFamily="49" charset="0"/>
+              </a:rPr>
+              <a:t>    </a:t>
+            </a:r>
+            <a:r>
+              <a:rPr lang="en-US" dirty="0">
+                <a:solidFill>
+                  <a:srgbClr val="FFC000"/>
+                </a:solidFill>
+                <a:latin typeface="Courier New" panose="02070309020205020404" pitchFamily="49" charset="0"/>
+                <a:cs typeface="Courier New" panose="02070309020205020404" pitchFamily="49" charset="0"/>
+              </a:rPr>
+              <a:t>print</a:t>
+            </a:r>
+            <a:r>
+              <a:rPr lang="en-US" dirty="0">
+                <a:latin typeface="Courier New" panose="02070309020205020404" pitchFamily="49" charset="0"/>
+                <a:cs typeface="Courier New" panose="02070309020205020404" pitchFamily="49" charset="0"/>
+              </a:rPr>
+              <a:t> </a:t>
+            </a:r>
+            <a:r>
+              <a:rPr lang="en-US" dirty="0">
+                <a:solidFill>
+                  <a:srgbClr val="00B050"/>
+                </a:solidFill>
+                <a:latin typeface="Courier New" panose="02070309020205020404" pitchFamily="49" charset="0"/>
+                <a:cs typeface="Courier New" panose="02070309020205020404" pitchFamily="49" charset="0"/>
+              </a:rPr>
+              <a:t>'</a:t>
             </a:r>
             <a:r>
               <a:rPr lang="en-US" dirty="0" err="1">
+                <a:solidFill>
+                  <a:srgbClr val="00B050"/>
+                </a:solidFill>
                 <a:latin typeface="Courier New" panose="02070309020205020404" pitchFamily="49" charset="0"/>
                 <a:cs typeface="Courier New" panose="02070309020205020404" pitchFamily="49" charset="0"/>
               </a:rPr>
@@ -4464,6 +4504,9 @@
             </a:r>
             <a:r>
               <a:rPr lang="en-US" dirty="0">
+                <a:solidFill>
+                  <a:srgbClr val="00B050"/>
+                </a:solidFill>
                 <a:latin typeface="Courier New" panose="02070309020205020404" pitchFamily="49" charset="0"/>
                 <a:cs typeface="Courier New" panose="02070309020205020404" pitchFamily="49" charset="0"/>
               </a:rPr>
@@ -4479,34 +4522,101 @@
                 <a:latin typeface="Courier New" panose="02070309020205020404" pitchFamily="49" charset="0"/>
                 <a:cs typeface="Courier New" panose="02070309020205020404" pitchFamily="49" charset="0"/>
               </a:rPr>
-              <a:t>    print 'bravo !'</a:t>
-            </a:r>
-          </a:p>
-          <a:p>
-            <a:pPr marL="0" indent="0">
-              <a:buNone/>
-            </a:pPr>
+              <a:t>    </a:t>
+            </a:r>
+            <a:r>
+              <a:rPr lang="en-US" dirty="0">
+                <a:solidFill>
+                  <a:srgbClr val="FFC000"/>
+                </a:solidFill>
+                <a:latin typeface="Courier New" panose="02070309020205020404" pitchFamily="49" charset="0"/>
+                <a:cs typeface="Courier New" panose="02070309020205020404" pitchFamily="49" charset="0"/>
+              </a:rPr>
+              <a:t>print</a:t>
+            </a:r>
             <a:r>
               <a:rPr lang="en-US" dirty="0">
                 <a:latin typeface="Courier New" panose="02070309020205020404" pitchFamily="49" charset="0"/>
                 <a:cs typeface="Courier New" panose="02070309020205020404" pitchFamily="49" charset="0"/>
               </a:rPr>
-              <a:t>else:</a:t>
+              <a:t> </a:t>
+            </a:r>
+            <a:r>
+              <a:rPr lang="en-US" dirty="0">
+                <a:solidFill>
+                  <a:srgbClr val="00B050"/>
+                </a:solidFill>
+                <a:latin typeface="Courier New" panose="02070309020205020404" pitchFamily="49" charset="0"/>
+                <a:cs typeface="Courier New" panose="02070309020205020404" pitchFamily="49" charset="0"/>
+              </a:rPr>
+              <a:t>'bravo !'</a:t>
             </a:r>
           </a:p>
           <a:p>
             <a:pPr marL="0" indent="0">
               <a:buNone/>
             </a:pPr>
+            <a:r>
+              <a:rPr lang="en-US" dirty="0">
+                <a:solidFill>
+                  <a:srgbClr val="FFC000"/>
+                </a:solidFill>
+                <a:latin typeface="Courier New" panose="02070309020205020404" pitchFamily="49" charset="0"/>
+                <a:cs typeface="Courier New" panose="02070309020205020404" pitchFamily="49" charset="0"/>
+              </a:rPr>
+              <a:t>else</a:t>
+            </a:r>
             <a:r>
               <a:rPr lang="en-US" dirty="0">
                 <a:latin typeface="Courier New" panose="02070309020205020404" pitchFamily="49" charset="0"/>
                 <a:cs typeface="Courier New" panose="02070309020205020404" pitchFamily="49" charset="0"/>
               </a:rPr>
-              <a:t>    print '</a:t>
+              <a:t>:</a:t>
+            </a:r>
+          </a:p>
+          <a:p>
+            <a:pPr marL="0" indent="0">
+              <a:buNone/>
+            </a:pPr>
+            <a:r>
+              <a:rPr lang="en-US" dirty="0">
+                <a:latin typeface="Courier New" panose="02070309020205020404" pitchFamily="49" charset="0"/>
+                <a:cs typeface="Courier New" panose="02070309020205020404" pitchFamily="49" charset="0"/>
+              </a:rPr>
+              <a:t>    </a:t>
+            </a:r>
+            <a:r>
+              <a:rPr lang="en-US" dirty="0">
+                <a:solidFill>
+                  <a:srgbClr val="FFC000"/>
+                </a:solidFill>
+                <a:latin typeface="Courier New" panose="02070309020205020404" pitchFamily="49" charset="0"/>
+                <a:cs typeface="Courier New" panose="02070309020205020404" pitchFamily="49" charset="0"/>
+              </a:rPr>
+              <a:t>print</a:t>
+            </a:r>
+            <a:r>
+              <a:rPr lang="en-US" dirty="0">
+                <a:latin typeface="Courier New" panose="02070309020205020404" pitchFamily="49" charset="0"/>
+                <a:cs typeface="Courier New" panose="02070309020205020404" pitchFamily="49" charset="0"/>
+              </a:rPr>
+              <a:t> </a:t>
+            </a:r>
+            <a:r>
+              <a:rPr lang="en-US" dirty="0">
+                <a:solidFill>
+                  <a:srgbClr val="00B050"/>
+                </a:solidFill>
+                <a:latin typeface="Courier New" panose="02070309020205020404" pitchFamily="49" charset="0"/>
+                <a:cs typeface="Courier New" panose="02070309020205020404" pitchFamily="49" charset="0"/>
+              </a:rPr>
+              <a:t>'</a:t>
             </a:r>
             <a:r>
               <a:rPr lang="en-US" dirty="0" err="1">
+                <a:solidFill>
+                  <a:srgbClr val="00B050"/>
+                </a:solidFill>
                 <a:latin typeface="Courier New" panose="02070309020205020404" pitchFamily="49" charset="0"/>
                 <a:cs typeface="Courier New" panose="02070309020205020404" pitchFamily="49" charset="0"/>
               </a:rPr>
@@ -4514,6 +4624,9 @@
             </a:r>
             <a:r>
               <a:rPr lang="en-US" dirty="0">
+                <a:solidFill>
+                  <a:srgbClr val="00B050"/>
+                </a:solidFill>
                 <a:latin typeface="Courier New" panose="02070309020205020404" pitchFamily="49" charset="0"/>
                 <a:cs typeface="Courier New" panose="02070309020205020404" pitchFamily="49" charset="0"/>
               </a:rPr>

</xml_diff>